<commit_message>
Added midterm 1 questions
</commit_message>
<xml_diff>
--- a/Lectures/Lecture 09_Gradient Descent.pptx
+++ b/Lectures/Lecture 09_Gradient Descent.pptx
@@ -291,7 +291,7 @@
           <a:p>
             <a:fld id="{A2A66397-F0F1-D843-B110-D1D2A5295B23}" type="datetimeFigureOut">
               <a:rPr lang="en-US" smtClean="0"/>
-              <a:t>2/15/22</a:t>
+              <a:t>10/6/23</a:t>
             </a:fld>
             <a:endParaRPr lang="en-US"/>
           </a:p>
@@ -468,7 +468,7 @@
           <a:p>
             <a:fld id="{3FE918EF-26F2-F641-9B39-65E2E78847ED}" type="datetimeFigureOut">
               <a:rPr lang="en-US" smtClean="0"/>
-              <a:t>2/15/22</a:t>
+              <a:t>10/6/23</a:t>
             </a:fld>
             <a:endParaRPr lang="en-US"/>
           </a:p>
@@ -1904,7 +1904,7 @@
             <a:fld id="{23A271A1-F6D6-438B-A432-4747EE7ECD40}" type="datetimeFigureOut">
               <a:rPr lang="en-US" smtClean="0"/>
               <a:pPr algn="ctr" eaLnBrk="1" latinLnBrk="0" hangingPunct="1"/>
-              <a:t>2/15/22</a:t>
+              <a:t>10/6/23</a:t>
             </a:fld>
             <a:endParaRPr lang="en-US" sz="2000" dirty="0">
               <a:solidFill>
@@ -2110,7 +2110,7 @@
             <a:fld id="{23A271A1-F6D6-438B-A432-4747EE7ECD40}" type="datetimeFigureOut">
               <a:rPr lang="en-US" smtClean="0"/>
               <a:pPr eaLnBrk="1" latinLnBrk="0" hangingPunct="1"/>
-              <a:t>2/15/22</a:t>
+              <a:t>10/6/23</a:t>
             </a:fld>
             <a:endParaRPr lang="en-US"/>
           </a:p>
@@ -2297,7 +2297,7 @@
             <a:fld id="{23A271A1-F6D6-438B-A432-4747EE7ECD40}" type="datetimeFigureOut">
               <a:rPr lang="en-US" smtClean="0"/>
               <a:pPr eaLnBrk="1" latinLnBrk="0" hangingPunct="1"/>
-              <a:t>2/15/22</a:t>
+              <a:t>10/6/23</a:t>
             </a:fld>
             <a:endParaRPr lang="en-US" dirty="0"/>
           </a:p>
@@ -2562,7 +2562,7 @@
             <a:fld id="{23A271A1-F6D6-438B-A432-4747EE7ECD40}" type="datetimeFigureOut">
               <a:rPr lang="en-US" smtClean="0"/>
               <a:pPr eaLnBrk="1" latinLnBrk="0" hangingPunct="1"/>
-              <a:t>2/15/22</a:t>
+              <a:t>10/6/23</a:t>
             </a:fld>
             <a:endParaRPr lang="en-US" dirty="0"/>
           </a:p>
@@ -2984,7 +2984,7 @@
             <a:fld id="{23A271A1-F6D6-438B-A432-4747EE7ECD40}" type="datetimeFigureOut">
               <a:rPr lang="en-US" smtClean="0"/>
               <a:pPr eaLnBrk="1" latinLnBrk="0" hangingPunct="1"/>
-              <a:t>2/15/22</a:t>
+              <a:t>10/6/23</a:t>
             </a:fld>
             <a:endParaRPr lang="en-US"/>
           </a:p>
@@ -3233,7 +3233,7 @@
             <a:fld id="{23A271A1-F6D6-438B-A432-4747EE7ECD40}" type="datetimeFigureOut">
               <a:rPr lang="en-US" smtClean="0"/>
               <a:pPr eaLnBrk="1" latinLnBrk="0" hangingPunct="1"/>
-              <a:t>2/15/22</a:t>
+              <a:t>10/6/23</a:t>
             </a:fld>
             <a:endParaRPr lang="en-US"/>
           </a:p>
@@ -3472,7 +3472,7 @@
             <a:fld id="{23A271A1-F6D6-438B-A432-4747EE7ECD40}" type="datetimeFigureOut">
               <a:rPr lang="en-US" smtClean="0"/>
               <a:pPr eaLnBrk="1" latinLnBrk="0" hangingPunct="1"/>
-              <a:t>2/15/22</a:t>
+              <a:t>10/6/23</a:t>
             </a:fld>
             <a:endParaRPr lang="en-US"/>
           </a:p>
@@ -3670,7 +3670,7 @@
             <a:fld id="{23A271A1-F6D6-438B-A432-4747EE7ECD40}" type="datetimeFigureOut">
               <a:rPr lang="en-US" smtClean="0"/>
               <a:pPr eaLnBrk="1" latinLnBrk="0" hangingPunct="1"/>
-              <a:t>2/15/22</a:t>
+              <a:t>10/6/23</a:t>
             </a:fld>
             <a:endParaRPr lang="en-US"/>
           </a:p>
@@ -3775,7 +3775,7 @@
             <a:fld id="{23A271A1-F6D6-438B-A432-4747EE7ECD40}" type="datetimeFigureOut">
               <a:rPr lang="en-US" smtClean="0"/>
               <a:pPr eaLnBrk="1" latinLnBrk="0" hangingPunct="1"/>
-              <a:t>2/15/22</a:t>
+              <a:t>10/6/23</a:t>
             </a:fld>
             <a:endParaRPr lang="en-US"/>
           </a:p>
@@ -3917,7 +3917,7 @@
             <a:fld id="{23A271A1-F6D6-438B-A432-4747EE7ECD40}" type="datetimeFigureOut">
               <a:rPr lang="en-US" smtClean="0"/>
               <a:pPr eaLnBrk="1" latinLnBrk="0" hangingPunct="1"/>
-              <a:t>2/15/22</a:t>
+              <a:t>10/6/23</a:t>
             </a:fld>
             <a:endParaRPr lang="en-US"/>
           </a:p>
@@ -4441,7 +4441,7 @@
             <a:fld id="{23A271A1-F6D6-438B-A432-4747EE7ECD40}" type="datetimeFigureOut">
               <a:rPr lang="en-US" smtClean="0"/>
               <a:pPr eaLnBrk="1" latinLnBrk="0" hangingPunct="1"/>
-              <a:t>2/15/22</a:t>
+              <a:t>10/6/23</a:t>
             </a:fld>
             <a:endParaRPr lang="en-US"/>
           </a:p>
@@ -4704,7 +4704,7 @@
             <a:fld id="{23A271A1-F6D6-438B-A432-4747EE7ECD40}" type="datetimeFigureOut">
               <a:rPr lang="en-US" smtClean="0"/>
               <a:pPr eaLnBrk="1" latinLnBrk="0" hangingPunct="1"/>
-              <a:t>2/15/22</a:t>
+              <a:t>10/6/23</a:t>
             </a:fld>
             <a:endParaRPr lang="en-US" sz="1400" dirty="0">
               <a:solidFill>
@@ -5698,13 +5698,8 @@
             </a:pPr>
             <a:r>
               <a:rPr lang="en-US" dirty="0"/>
-              <a:t>make your argument/analysis clear </a:t>
-            </a:r>
-            <a:r>
-              <a:rPr lang="en-US"/>
-              <a:t>and concise</a:t>
-            </a:r>
-            <a:endParaRPr lang="en-US" dirty="0"/>
+              <a:t>make your argument/analysis clear and concise</a:t>
+            </a:r>
           </a:p>
         </p:txBody>
       </p:sp>
@@ -17878,12 +17873,12 @@
           <a:graphicData uri="http://schemas.openxmlformats.org/presentationml/2006/ole">
             <mc:AlternateContent xmlns:mc="http://schemas.openxmlformats.org/markup-compatibility/2006">
               <mc:Choice xmlns:v="urn:schemas-microsoft-com:vml" Requires="v">
-                <p:oleObj spid="_x0000_s2753" name="Equation" r:id="rId3" imgW="1130300" imgH="203200" progId="Equation.3">
+                <p:oleObj name="Equation" r:id="rId2" imgW="1130300" imgH="203200" progId="Equation.3">
                   <p:embed/>
                 </p:oleObj>
               </mc:Choice>
               <mc:Fallback>
-                <p:oleObj name="Equation" r:id="rId3" imgW="1130300" imgH="203200" progId="Equation.3">
+                <p:oleObj name="Equation" r:id="rId2" imgW="1130300" imgH="203200" progId="Equation.3">
                   <p:embed/>
                   <p:pic>
                     <p:nvPicPr>
@@ -17892,7 +17887,7 @@
                       <p:nvPr/>
                     </p:nvPicPr>
                     <p:blipFill>
-                      <a:blip r:embed="rId4"/>
+                      <a:blip r:embed="rId3"/>
                       <a:stretch>
                         <a:fillRect/>
                       </a:stretch>
@@ -17964,12 +17959,12 @@
           <a:graphicData uri="http://schemas.openxmlformats.org/presentationml/2006/ole">
             <mc:AlternateContent xmlns:mc="http://schemas.openxmlformats.org/markup-compatibility/2006">
               <mc:Choice xmlns:v="urn:schemas-microsoft-com:vml" Requires="v">
-                <p:oleObj spid="_x0000_s2754" name="Equation" r:id="rId5" imgW="1524000" imgH="215900" progId="Equation.3">
+                <p:oleObj name="Equation" r:id="rId4" imgW="1524000" imgH="215900" progId="Equation.3">
                   <p:embed/>
                 </p:oleObj>
               </mc:Choice>
               <mc:Fallback>
-                <p:oleObj name="Equation" r:id="rId5" imgW="1524000" imgH="215900" progId="Equation.3">
+                <p:oleObj name="Equation" r:id="rId4" imgW="1524000" imgH="215900" progId="Equation.3">
                   <p:embed/>
                   <p:pic>
                     <p:nvPicPr>
@@ -17978,7 +17973,7 @@
                       <p:nvPr/>
                     </p:nvPicPr>
                     <p:blipFill>
-                      <a:blip r:embed="rId6"/>
+                      <a:blip r:embed="rId5"/>
                       <a:stretch>
                         <a:fillRect/>
                       </a:stretch>
@@ -18021,12 +18016,12 @@
           <a:graphicData uri="http://schemas.openxmlformats.org/presentationml/2006/ole">
             <mc:AlternateContent xmlns:mc="http://schemas.openxmlformats.org/markup-compatibility/2006">
               <mc:Choice xmlns:v="urn:schemas-microsoft-com:vml" Requires="v">
-                <p:oleObj spid="_x0000_s2755" name="Equation" r:id="rId7" imgW="1041400" imgH="330200" progId="Equation.3">
+                <p:oleObj name="Equation" r:id="rId6" imgW="1041400" imgH="330200" progId="Equation.3">
                   <p:embed/>
                 </p:oleObj>
               </mc:Choice>
               <mc:Fallback>
-                <p:oleObj name="Equation" r:id="rId7" imgW="1041400" imgH="330200" progId="Equation.3">
+                <p:oleObj name="Equation" r:id="rId6" imgW="1041400" imgH="330200" progId="Equation.3">
                   <p:embed/>
                   <p:pic>
                     <p:nvPicPr>
@@ -18035,7 +18030,7 @@
                       <p:nvPr/>
                     </p:nvPicPr>
                     <p:blipFill>
-                      <a:blip r:embed="rId8"/>
+                      <a:blip r:embed="rId7"/>
                       <a:stretch>
                         <a:fillRect/>
                       </a:stretch>
@@ -18065,7 +18060,7 @@
           <p:nvPr/>
         </p:nvPicPr>
         <p:blipFill>
-          <a:blip r:embed="rId9"/>
+          <a:blip r:embed="rId8"/>
           <a:stretch>
             <a:fillRect/>
           </a:stretch>
@@ -18348,12 +18343,12 @@
           <a:graphicData uri="http://schemas.openxmlformats.org/presentationml/2006/ole">
             <mc:AlternateContent xmlns:mc="http://schemas.openxmlformats.org/markup-compatibility/2006">
               <mc:Choice xmlns:v="urn:schemas-microsoft-com:vml" Requires="v">
-                <p:oleObj spid="_x0000_s3308" name="Equation" r:id="rId3" imgW="1600200" imgH="330200" progId="Equation.3">
+                <p:oleObj name="Equation" r:id="rId2" imgW="1600200" imgH="330200" progId="Equation.3">
                   <p:embed/>
                 </p:oleObj>
               </mc:Choice>
               <mc:Fallback>
-                <p:oleObj name="Equation" r:id="rId3" imgW="1600200" imgH="330200" progId="Equation.3">
+                <p:oleObj name="Equation" r:id="rId2" imgW="1600200" imgH="330200" progId="Equation.3">
                   <p:embed/>
                   <p:pic>
                     <p:nvPicPr>
@@ -18362,7 +18357,7 @@
                       <p:nvPr/>
                     </p:nvPicPr>
                     <p:blipFill>
-                      <a:blip r:embed="rId4"/>
+                      <a:blip r:embed="rId3"/>
                       <a:stretch>
                         <a:fillRect/>
                       </a:stretch>
@@ -20150,12 +20145,12 @@
           <a:graphicData uri="http://schemas.openxmlformats.org/presentationml/2006/ole">
             <mc:AlternateContent xmlns:mc="http://schemas.openxmlformats.org/markup-compatibility/2006">
               <mc:Choice xmlns:v="urn:schemas-microsoft-com:vml" Requires="v">
-                <p:oleObj spid="_x0000_s1257" name="Equation" r:id="rId3" imgW="1600200" imgH="330200" progId="Equation.3">
+                <p:oleObj name="Equation" r:id="rId2" imgW="1600200" imgH="330200" progId="Equation.3">
                   <p:embed/>
                 </p:oleObj>
               </mc:Choice>
               <mc:Fallback>
-                <p:oleObj name="Equation" r:id="rId3" imgW="1600200" imgH="330200" progId="Equation.3">
+                <p:oleObj name="Equation" r:id="rId2" imgW="1600200" imgH="330200" progId="Equation.3">
                   <p:embed/>
                   <p:pic>
                     <p:nvPicPr>
@@ -20164,7 +20159,7 @@
                       <p:nvPr/>
                     </p:nvPicPr>
                     <p:blipFill>
-                      <a:blip r:embed="rId4"/>
+                      <a:blip r:embed="rId3"/>
                       <a:stretch>
                         <a:fillRect/>
                       </a:stretch>
@@ -20308,12 +20303,12 @@
           <a:graphicData uri="http://schemas.openxmlformats.org/presentationml/2006/ole">
             <mc:AlternateContent xmlns:mc="http://schemas.openxmlformats.org/markup-compatibility/2006">
               <mc:Choice xmlns:v="urn:schemas-microsoft-com:vml" Requires="v">
-                <p:oleObj spid="_x0000_s8653" name="Equation" r:id="rId3" imgW="1117600" imgH="177800" progId="Equation.3">
+                <p:oleObj name="Equation" r:id="rId2" imgW="1117600" imgH="177800" progId="Equation.3">
                   <p:embed/>
                 </p:oleObj>
               </mc:Choice>
               <mc:Fallback>
-                <p:oleObj name="Equation" r:id="rId3" imgW="1117600" imgH="177800" progId="Equation.3">
+                <p:oleObj name="Equation" r:id="rId2" imgW="1117600" imgH="177800" progId="Equation.3">
                   <p:embed/>
                   <p:pic>
                     <p:nvPicPr>
@@ -20322,7 +20317,7 @@
                       <p:nvPr/>
                     </p:nvPicPr>
                     <p:blipFill>
-                      <a:blip r:embed="rId4"/>
+                      <a:blip r:embed="rId3"/>
                       <a:stretch>
                         <a:fillRect/>
                       </a:stretch>
@@ -20365,12 +20360,12 @@
           <a:graphicData uri="http://schemas.openxmlformats.org/presentationml/2006/ole">
             <mc:AlternateContent xmlns:mc="http://schemas.openxmlformats.org/markup-compatibility/2006">
               <mc:Choice xmlns:v="urn:schemas-microsoft-com:vml" Requires="v">
-                <p:oleObj spid="_x0000_s8654" name="Equation" r:id="rId5" imgW="876300" imgH="203200" progId="Equation.3">
+                <p:oleObj name="Equation" r:id="rId4" imgW="876300" imgH="203200" progId="Equation.3">
                   <p:embed/>
                 </p:oleObj>
               </mc:Choice>
               <mc:Fallback>
-                <p:oleObj name="Equation" r:id="rId5" imgW="876300" imgH="203200" progId="Equation.3">
+                <p:oleObj name="Equation" r:id="rId4" imgW="876300" imgH="203200" progId="Equation.3">
                   <p:embed/>
                   <p:pic>
                     <p:nvPicPr>
@@ -20379,7 +20374,7 @@
                       <p:nvPr/>
                     </p:nvPicPr>
                     <p:blipFill>
-                      <a:blip r:embed="rId6"/>
+                      <a:blip r:embed="rId5"/>
                       <a:stretch>
                         <a:fillRect/>
                       </a:stretch>
@@ -22155,12 +22150,12 @@
           <a:graphicData uri="http://schemas.openxmlformats.org/presentationml/2006/ole">
             <mc:AlternateContent xmlns:mc="http://schemas.openxmlformats.org/markup-compatibility/2006">
               <mc:Choice xmlns:v="urn:schemas-microsoft-com:vml" Requires="v">
-                <p:oleObj spid="_x0000_s10459" name="Equation" r:id="rId4" imgW="1041400" imgH="330200" progId="Equation.3">
+                <p:oleObj name="Equation" r:id="rId3" imgW="1041400" imgH="330200" progId="Equation.3">
                   <p:embed/>
                 </p:oleObj>
               </mc:Choice>
               <mc:Fallback>
-                <p:oleObj name="Equation" r:id="rId4" imgW="1041400" imgH="330200" progId="Equation.3">
+                <p:oleObj name="Equation" r:id="rId3" imgW="1041400" imgH="330200" progId="Equation.3">
                   <p:embed/>
                   <p:pic>
                     <p:nvPicPr>
@@ -22169,7 +22164,7 @@
                       <p:nvPr/>
                     </p:nvPicPr>
                     <p:blipFill>
-                      <a:blip r:embed="rId5"/>
+                      <a:blip r:embed="rId4"/>
                       <a:stretch>
                         <a:fillRect/>
                       </a:stretch>
@@ -22199,7 +22194,7 @@
           <p:nvPr/>
         </p:nvPicPr>
         <p:blipFill>
-          <a:blip r:embed="rId6"/>
+          <a:blip r:embed="rId5"/>
           <a:stretch>
             <a:fillRect/>
           </a:stretch>
@@ -22288,12 +22283,12 @@
           <a:graphicData uri="http://schemas.openxmlformats.org/presentationml/2006/ole">
             <mc:AlternateContent xmlns:mc="http://schemas.openxmlformats.org/markup-compatibility/2006">
               <mc:Choice xmlns:v="urn:schemas-microsoft-com:vml" Requires="v">
-                <p:oleObj spid="_x0000_s11677" name="Equation" r:id="rId3" imgW="1689100" imgH="558800" progId="Equation.3">
+                <p:oleObj name="Equation" r:id="rId2" imgW="1689100" imgH="558800" progId="Equation.3">
                   <p:embed/>
                 </p:oleObj>
               </mc:Choice>
               <mc:Fallback>
-                <p:oleObj name="Equation" r:id="rId3" imgW="1689100" imgH="558800" progId="Equation.3">
+                <p:oleObj name="Equation" r:id="rId2" imgW="1689100" imgH="558800" progId="Equation.3">
                   <p:embed/>
                   <p:pic>
                     <p:nvPicPr>
@@ -22302,7 +22297,7 @@
                       <p:nvPr/>
                     </p:nvPicPr>
                     <p:blipFill>
-                      <a:blip r:embed="rId4"/>
+                      <a:blip r:embed="rId3"/>
                       <a:stretch>
                         <a:fillRect/>
                       </a:stretch>
@@ -22374,12 +22369,12 @@
           <a:graphicData uri="http://schemas.openxmlformats.org/presentationml/2006/ole">
             <mc:AlternateContent xmlns:mc="http://schemas.openxmlformats.org/markup-compatibility/2006">
               <mc:Choice xmlns:v="urn:schemas-microsoft-com:vml" Requires="v">
-                <p:oleObj spid="_x0000_s11678" name="Equation" r:id="rId5" imgW="3098800" imgH="393700" progId="Equation.3">
+                <p:oleObj name="Equation" r:id="rId4" imgW="3098800" imgH="393700" progId="Equation.3">
                   <p:embed/>
                 </p:oleObj>
               </mc:Choice>
               <mc:Fallback>
-                <p:oleObj name="Equation" r:id="rId5" imgW="3098800" imgH="393700" progId="Equation.3">
+                <p:oleObj name="Equation" r:id="rId4" imgW="3098800" imgH="393700" progId="Equation.3">
                   <p:embed/>
                   <p:pic>
                     <p:nvPicPr>
@@ -22388,7 +22383,7 @@
                       <p:nvPr/>
                     </p:nvPicPr>
                     <p:blipFill>
-                      <a:blip r:embed="rId6"/>
+                      <a:blip r:embed="rId5"/>
                       <a:stretch>
                         <a:fillRect/>
                       </a:stretch>
@@ -22887,12 +22882,12 @@
           <a:graphicData uri="http://schemas.openxmlformats.org/presentationml/2006/ole">
             <mc:AlternateContent xmlns:mc="http://schemas.openxmlformats.org/markup-compatibility/2006">
               <mc:Choice xmlns:v="urn:schemas-microsoft-com:vml" Requires="v">
-                <p:oleObj spid="_x0000_s13517" name="Equation" r:id="rId3" imgW="838200" imgH="482600" progId="Equation.3">
+                <p:oleObj name="Equation" r:id="rId2" imgW="838200" imgH="482600" progId="Equation.3">
                   <p:embed/>
                 </p:oleObj>
               </mc:Choice>
               <mc:Fallback>
-                <p:oleObj name="Equation" r:id="rId3" imgW="838200" imgH="482600" progId="Equation.3">
+                <p:oleObj name="Equation" r:id="rId2" imgW="838200" imgH="482600" progId="Equation.3">
                   <p:embed/>
                   <p:pic>
                     <p:nvPicPr>
@@ -22901,7 +22896,7 @@
                       <p:nvPr/>
                     </p:nvPicPr>
                     <p:blipFill>
-                      <a:blip r:embed="rId4"/>
+                      <a:blip r:embed="rId3"/>
                       <a:stretch>
                         <a:fillRect/>
                       </a:stretch>
@@ -23050,7 +23045,7 @@
           <p:nvPr/>
         </p:nvPicPr>
         <p:blipFill>
-          <a:blip r:embed="rId4"/>
+          <a:blip r:embed="rId3"/>
           <a:stretch>
             <a:fillRect/>
           </a:stretch>
@@ -23210,12 +23205,12 @@
           <a:graphicData uri="http://schemas.openxmlformats.org/presentationml/2006/ole">
             <mc:AlternateContent xmlns:mc="http://schemas.openxmlformats.org/markup-compatibility/2006">
               <mc:Choice xmlns:v="urn:schemas-microsoft-com:vml" Requires="v">
-                <p:oleObj spid="_x0000_s12697" name="Equation" r:id="rId5" imgW="1333500" imgH="457200" progId="Equation.3">
+                <p:oleObj name="Equation" r:id="rId4" imgW="1333500" imgH="457200" progId="Equation.3">
                   <p:embed/>
                 </p:oleObj>
               </mc:Choice>
               <mc:Fallback>
-                <p:oleObj name="Equation" r:id="rId5" imgW="1333500" imgH="457200" progId="Equation.3">
+                <p:oleObj name="Equation" r:id="rId4" imgW="1333500" imgH="457200" progId="Equation.3">
                   <p:embed/>
                   <p:pic>
                     <p:nvPicPr>
@@ -23224,7 +23219,7 @@
                       <p:nvPr/>
                     </p:nvPicPr>
                     <p:blipFill>
-                      <a:blip r:embed="rId6"/>
+                      <a:blip r:embed="rId5"/>
                       <a:stretch>
                         <a:fillRect/>
                       </a:stretch>
@@ -23300,12 +23295,12 @@
           <a:graphicData uri="http://schemas.openxmlformats.org/presentationml/2006/ole">
             <mc:AlternateContent xmlns:mc="http://schemas.openxmlformats.org/markup-compatibility/2006">
               <mc:Choice xmlns:v="urn:schemas-microsoft-com:vml" Requires="v">
-                <p:oleObj spid="_x0000_s12698" name="Equation" r:id="rId7" imgW="1041400" imgH="330200" progId="Equation.3">
+                <p:oleObj name="Equation" r:id="rId6" imgW="1041400" imgH="330200" progId="Equation.3">
                   <p:embed/>
                 </p:oleObj>
               </mc:Choice>
               <mc:Fallback>
-                <p:oleObj name="Equation" r:id="rId7" imgW="1041400" imgH="330200" progId="Equation.3">
+                <p:oleObj name="Equation" r:id="rId6" imgW="1041400" imgH="330200" progId="Equation.3">
                   <p:embed/>
                   <p:pic>
                     <p:nvPicPr>
@@ -23314,7 +23309,7 @@
                       <p:nvPr/>
                     </p:nvPicPr>
                     <p:blipFill>
-                      <a:blip r:embed="rId8"/>
+                      <a:blip r:embed="rId7"/>
                       <a:stretch>
                         <a:fillRect/>
                       </a:stretch>
@@ -23409,12 +23404,12 @@
           <a:graphicData uri="http://schemas.openxmlformats.org/presentationml/2006/ole">
             <mc:AlternateContent xmlns:mc="http://schemas.openxmlformats.org/markup-compatibility/2006">
               <mc:Choice xmlns:v="urn:schemas-microsoft-com:vml" Requires="v">
-                <p:oleObj spid="_x0000_s15042" name="Equation" r:id="rId3" imgW="1333500" imgH="457200" progId="Equation.3">
+                <p:oleObj name="Equation" r:id="rId2" imgW="1333500" imgH="457200" progId="Equation.3">
                   <p:embed/>
                 </p:oleObj>
               </mc:Choice>
               <mc:Fallback>
-                <p:oleObj name="Equation" r:id="rId3" imgW="1333500" imgH="457200" progId="Equation.3">
+                <p:oleObj name="Equation" r:id="rId2" imgW="1333500" imgH="457200" progId="Equation.3">
                   <p:embed/>
                   <p:pic>
                     <p:nvPicPr>
@@ -23423,7 +23418,7 @@
                       <p:nvPr/>
                     </p:nvPicPr>
                     <p:blipFill>
-                      <a:blip r:embed="rId4"/>
+                      <a:blip r:embed="rId3"/>
                       <a:stretch>
                         <a:fillRect/>
                       </a:stretch>
@@ -24170,12 +24165,12 @@
           <a:graphicData uri="http://schemas.openxmlformats.org/presentationml/2006/ole">
             <mc:AlternateContent xmlns:mc="http://schemas.openxmlformats.org/markup-compatibility/2006">
               <mc:Choice xmlns:v="urn:schemas-microsoft-com:vml" Requires="v">
-                <p:oleObj spid="_x0000_s16945" name="Equation" r:id="rId4" imgW="1333500" imgH="457200" progId="Equation.3">
+                <p:oleObj name="Equation" r:id="rId3" imgW="1333500" imgH="457200" progId="Equation.3">
                   <p:embed/>
                 </p:oleObj>
               </mc:Choice>
               <mc:Fallback>
-                <p:oleObj name="Equation" r:id="rId4" imgW="1333500" imgH="457200" progId="Equation.3">
+                <p:oleObj name="Equation" r:id="rId3" imgW="1333500" imgH="457200" progId="Equation.3">
                   <p:embed/>
                   <p:pic>
                     <p:nvPicPr>
@@ -24184,7 +24179,7 @@
                       <p:nvPr/>
                     </p:nvPicPr>
                     <p:blipFill>
-                      <a:blip r:embed="rId5"/>
+                      <a:blip r:embed="rId4"/>
                       <a:stretch>
                         <a:fillRect/>
                       </a:stretch>
@@ -24227,12 +24222,12 @@
           <a:graphicData uri="http://schemas.openxmlformats.org/presentationml/2006/ole">
             <mc:AlternateContent xmlns:mc="http://schemas.openxmlformats.org/markup-compatibility/2006">
               <mc:Choice xmlns:v="urn:schemas-microsoft-com:vml" Requires="v">
-                <p:oleObj spid="_x0000_s16946" name="Equation" r:id="rId6" imgW="1917700" imgH="457200" progId="Equation.3">
+                <p:oleObj name="Equation" r:id="rId5" imgW="1917700" imgH="457200" progId="Equation.3">
                   <p:embed/>
                 </p:oleObj>
               </mc:Choice>
               <mc:Fallback>
-                <p:oleObj name="Equation" r:id="rId6" imgW="1917700" imgH="457200" progId="Equation.3">
+                <p:oleObj name="Equation" r:id="rId5" imgW="1917700" imgH="457200" progId="Equation.3">
                   <p:embed/>
                   <p:pic>
                     <p:nvPicPr>
@@ -24241,7 +24236,7 @@
                       <p:nvPr/>
                     </p:nvPicPr>
                     <p:blipFill>
-                      <a:blip r:embed="rId7"/>
+                      <a:blip r:embed="rId6"/>
                       <a:stretch>
                         <a:fillRect/>
                       </a:stretch>
@@ -24317,12 +24312,12 @@
           <a:graphicData uri="http://schemas.openxmlformats.org/presentationml/2006/ole">
             <mc:AlternateContent xmlns:mc="http://schemas.openxmlformats.org/markup-compatibility/2006">
               <mc:Choice xmlns:v="urn:schemas-microsoft-com:vml" Requires="v">
-                <p:oleObj spid="_x0000_s16947" name="Equation" r:id="rId8" imgW="1041400" imgH="330200" progId="Equation.3">
+                <p:oleObj name="Equation" r:id="rId7" imgW="1041400" imgH="330200" progId="Equation.3">
                   <p:embed/>
                 </p:oleObj>
               </mc:Choice>
               <mc:Fallback>
-                <p:oleObj name="Equation" r:id="rId8" imgW="1041400" imgH="330200" progId="Equation.3">
+                <p:oleObj name="Equation" r:id="rId7" imgW="1041400" imgH="330200" progId="Equation.3">
                   <p:embed/>
                   <p:pic>
                     <p:nvPicPr>
@@ -24331,7 +24326,7 @@
                       <p:nvPr/>
                     </p:nvPicPr>
                     <p:blipFill>
-                      <a:blip r:embed="rId9"/>
+                      <a:blip r:embed="rId8"/>
                       <a:stretch>
                         <a:fillRect/>
                       </a:stretch>
@@ -24426,12 +24421,12 @@
           <a:graphicData uri="http://schemas.openxmlformats.org/presentationml/2006/ole">
             <mc:AlternateContent xmlns:mc="http://schemas.openxmlformats.org/markup-compatibility/2006">
               <mc:Choice xmlns:v="urn:schemas-microsoft-com:vml" Requires="v">
-                <p:oleObj spid="_x0000_s18613" name="Equation" r:id="rId3" imgW="1917700" imgH="457200" progId="Equation.3">
+                <p:oleObj name="Equation" r:id="rId2" imgW="1917700" imgH="457200" progId="Equation.3">
                   <p:embed/>
                 </p:oleObj>
               </mc:Choice>
               <mc:Fallback>
-                <p:oleObj name="Equation" r:id="rId3" imgW="1917700" imgH="457200" progId="Equation.3">
+                <p:oleObj name="Equation" r:id="rId2" imgW="1917700" imgH="457200" progId="Equation.3">
                   <p:embed/>
                   <p:pic>
                     <p:nvPicPr>
@@ -24440,7 +24435,7 @@
                       <p:nvPr/>
                     </p:nvPicPr>
                     <p:blipFill>
-                      <a:blip r:embed="rId4"/>
+                      <a:blip r:embed="rId3"/>
                       <a:stretch>
                         <a:fillRect/>
                       </a:stretch>
@@ -24865,12 +24860,12 @@
           <a:graphicData uri="http://schemas.openxmlformats.org/presentationml/2006/ole">
             <mc:AlternateContent xmlns:mc="http://schemas.openxmlformats.org/markup-compatibility/2006">
               <mc:Choice xmlns:v="urn:schemas-microsoft-com:vml" Requires="v">
-                <p:oleObj spid="_x0000_s35981" name="Equation" r:id="rId3" imgW="1333500" imgH="457200" progId="Equation.3">
+                <p:oleObj name="Equation" r:id="rId2" imgW="1333500" imgH="457200" progId="Equation.3">
                   <p:embed/>
                 </p:oleObj>
               </mc:Choice>
               <mc:Fallback>
-                <p:oleObj name="Equation" r:id="rId3" imgW="1333500" imgH="457200" progId="Equation.3">
+                <p:oleObj name="Equation" r:id="rId2" imgW="1333500" imgH="457200" progId="Equation.3">
                   <p:embed/>
                   <p:pic>
                     <p:nvPicPr>
@@ -24879,7 +24874,7 @@
                       <p:nvPr/>
                     </p:nvPicPr>
                     <p:blipFill>
-                      <a:blip r:embed="rId4"/>
+                      <a:blip r:embed="rId3"/>
                       <a:stretch>
                         <a:fillRect/>
                       </a:stretch>
@@ -26127,12 +26122,12 @@
           <a:graphicData uri="http://schemas.openxmlformats.org/presentationml/2006/ole">
             <mc:AlternateContent xmlns:mc="http://schemas.openxmlformats.org/markup-compatibility/2006">
               <mc:Choice xmlns:v="urn:schemas-microsoft-com:vml" Requires="v">
-                <p:oleObj spid="_x0000_s37002" name="Equation" r:id="rId3" imgW="1333500" imgH="457200" progId="Equation.3">
+                <p:oleObj name="Equation" r:id="rId2" imgW="1333500" imgH="457200" progId="Equation.3">
                   <p:embed/>
                 </p:oleObj>
               </mc:Choice>
               <mc:Fallback>
-                <p:oleObj name="Equation" r:id="rId3" imgW="1333500" imgH="457200" progId="Equation.3">
+                <p:oleObj name="Equation" r:id="rId2" imgW="1333500" imgH="457200" progId="Equation.3">
                   <p:embed/>
                   <p:pic>
                     <p:nvPicPr>
@@ -26141,7 +26136,7 @@
                       <p:nvPr/>
                     </p:nvPicPr>
                     <p:blipFill>
-                      <a:blip r:embed="rId4"/>
+                      <a:blip r:embed="rId3"/>
                       <a:stretch>
                         <a:fillRect/>
                       </a:stretch>
@@ -26236,12 +26231,12 @@
           <a:graphicData uri="http://schemas.openxmlformats.org/presentationml/2006/ole">
             <mc:AlternateContent xmlns:mc="http://schemas.openxmlformats.org/markup-compatibility/2006">
               <mc:Choice xmlns:v="urn:schemas-microsoft-com:vml" Requires="v">
-                <p:oleObj spid="_x0000_s19637" name="Equation" r:id="rId3" imgW="1917700" imgH="457200" progId="Equation.3">
+                <p:oleObj name="Equation" r:id="rId2" imgW="1917700" imgH="457200" progId="Equation.3">
                   <p:embed/>
                 </p:oleObj>
               </mc:Choice>
               <mc:Fallback>
-                <p:oleObj name="Equation" r:id="rId3" imgW="1917700" imgH="457200" progId="Equation.3">
+                <p:oleObj name="Equation" r:id="rId2" imgW="1917700" imgH="457200" progId="Equation.3">
                   <p:embed/>
                   <p:pic>
                     <p:nvPicPr>
@@ -26250,7 +26245,7 @@
                       <p:nvPr/>
                     </p:nvPicPr>
                     <p:blipFill>
-                      <a:blip r:embed="rId4"/>
+                      <a:blip r:embed="rId3"/>
                       <a:stretch>
                         <a:fillRect/>
                       </a:stretch>
@@ -27957,12 +27952,12 @@
           <a:graphicData uri="http://schemas.openxmlformats.org/presentationml/2006/ole">
             <mc:AlternateContent xmlns:mc="http://schemas.openxmlformats.org/markup-compatibility/2006">
               <mc:Choice xmlns:v="urn:schemas-microsoft-com:vml" Requires="v">
-                <p:oleObj spid="_x0000_s41089" name="Equation" r:id="rId3" imgW="1155700" imgH="241300" progId="Equation.3">
+                <p:oleObj name="Equation" r:id="rId2" imgW="1155700" imgH="241300" progId="Equation.3">
                   <p:embed/>
                 </p:oleObj>
               </mc:Choice>
               <mc:Fallback>
-                <p:oleObj name="Equation" r:id="rId3" imgW="1155700" imgH="241300" progId="Equation.3">
+                <p:oleObj name="Equation" r:id="rId2" imgW="1155700" imgH="241300" progId="Equation.3">
                   <p:embed/>
                   <p:pic>
                     <p:nvPicPr>
@@ -27971,7 +27966,7 @@
                       <p:nvPr/>
                     </p:nvPicPr>
                     <p:blipFill>
-                      <a:blip r:embed="rId4"/>
+                      <a:blip r:embed="rId3"/>
                       <a:stretch>
                         <a:fillRect/>
                       </a:stretch>
@@ -28095,12 +28090,12 @@
           <a:graphicData uri="http://schemas.openxmlformats.org/presentationml/2006/ole">
             <mc:AlternateContent xmlns:mc="http://schemas.openxmlformats.org/markup-compatibility/2006">
               <mc:Choice xmlns:v="urn:schemas-microsoft-com:vml" Requires="v">
-                <p:oleObj spid="_x0000_s85179" name="Equation" r:id="rId3" imgW="1155700" imgH="241300" progId="Equation.3">
+                <p:oleObj name="Equation" r:id="rId2" imgW="1155700" imgH="241300" progId="Equation.3">
                   <p:embed/>
                 </p:oleObj>
               </mc:Choice>
               <mc:Fallback>
-                <p:oleObj name="Equation" r:id="rId3" imgW="1155700" imgH="241300" progId="Equation.3">
+                <p:oleObj name="Equation" r:id="rId2" imgW="1155700" imgH="241300" progId="Equation.3">
                   <p:embed/>
                   <p:pic>
                     <p:nvPicPr>
@@ -28109,7 +28104,7 @@
                       <p:nvPr/>
                     </p:nvPicPr>
                     <p:blipFill>
-                      <a:blip r:embed="rId4"/>
+                      <a:blip r:embed="rId3"/>
                       <a:stretch>
                         <a:fillRect/>
                       </a:stretch>
@@ -28210,12 +28205,12 @@
           <a:graphicData uri="http://schemas.openxmlformats.org/presentationml/2006/ole">
             <mc:AlternateContent xmlns:mc="http://schemas.openxmlformats.org/markup-compatibility/2006">
               <mc:Choice xmlns:v="urn:schemas-microsoft-com:vml" Requires="v">
-                <p:oleObj spid="_x0000_s85180" name="Equation" r:id="rId5" imgW="1422400" imgH="203200" progId="Equation.3">
+                <p:oleObj name="Equation" r:id="rId4" imgW="1422400" imgH="203200" progId="Equation.3">
                   <p:embed/>
                 </p:oleObj>
               </mc:Choice>
               <mc:Fallback>
-                <p:oleObj name="Equation" r:id="rId5" imgW="1422400" imgH="203200" progId="Equation.3">
+                <p:oleObj name="Equation" r:id="rId4" imgW="1422400" imgH="203200" progId="Equation.3">
                   <p:embed/>
                   <p:pic>
                     <p:nvPicPr>
@@ -28224,7 +28219,7 @@
                       <p:nvPr/>
                     </p:nvPicPr>
                     <p:blipFill>
-                      <a:blip r:embed="rId6"/>
+                      <a:blip r:embed="rId5"/>
                       <a:stretch>
                         <a:fillRect/>
                       </a:stretch>
@@ -28296,12 +28291,12 @@
           <a:graphicData uri="http://schemas.openxmlformats.org/presentationml/2006/ole">
             <mc:AlternateContent xmlns:mc="http://schemas.openxmlformats.org/markup-compatibility/2006">
               <mc:Choice xmlns:v="urn:schemas-microsoft-com:vml" Requires="v">
-                <p:oleObj spid="_x0000_s85181" name="Equation" r:id="rId7" imgW="1155700" imgH="203200" progId="Equation.3">
+                <p:oleObj name="Equation" r:id="rId6" imgW="1155700" imgH="203200" progId="Equation.3">
                   <p:embed/>
                 </p:oleObj>
               </mc:Choice>
               <mc:Fallback>
-                <p:oleObj name="Equation" r:id="rId7" imgW="1155700" imgH="203200" progId="Equation.3">
+                <p:oleObj name="Equation" r:id="rId6" imgW="1155700" imgH="203200" progId="Equation.3">
                   <p:embed/>
                   <p:pic>
                     <p:nvPicPr>
@@ -28310,7 +28305,7 @@
                       <p:nvPr/>
                     </p:nvPicPr>
                     <p:blipFill>
-                      <a:blip r:embed="rId8"/>
+                      <a:blip r:embed="rId7"/>
                       <a:stretch>
                         <a:fillRect/>
                       </a:stretch>
@@ -28382,12 +28377,12 @@
           <a:graphicData uri="http://schemas.openxmlformats.org/presentationml/2006/ole">
             <mc:AlternateContent xmlns:mc="http://schemas.openxmlformats.org/markup-compatibility/2006">
               <mc:Choice xmlns:v="urn:schemas-microsoft-com:vml" Requires="v">
-                <p:oleObj spid="_x0000_s85182" name="Equation" r:id="rId9" imgW="1054100" imgH="228600" progId="Equation.3">
+                <p:oleObj name="Equation" r:id="rId8" imgW="1054100" imgH="228600" progId="Equation.3">
                   <p:embed/>
                 </p:oleObj>
               </mc:Choice>
               <mc:Fallback>
-                <p:oleObj name="Equation" r:id="rId9" imgW="1054100" imgH="228600" progId="Equation.3">
+                <p:oleObj name="Equation" r:id="rId8" imgW="1054100" imgH="228600" progId="Equation.3">
                   <p:embed/>
                   <p:pic>
                     <p:nvPicPr>
@@ -28396,7 +28391,7 @@
                       <p:nvPr/>
                     </p:nvPicPr>
                     <p:blipFill>
-                      <a:blip r:embed="rId10"/>
+                      <a:blip r:embed="rId9"/>
                       <a:stretch>
                         <a:fillRect/>
                       </a:stretch>
@@ -28524,12 +28519,12 @@
           <a:graphicData uri="http://schemas.openxmlformats.org/presentationml/2006/ole">
             <mc:AlternateContent xmlns:mc="http://schemas.openxmlformats.org/markup-compatibility/2006">
               <mc:Choice xmlns:v="urn:schemas-microsoft-com:vml" Requires="v">
-                <p:oleObj spid="_x0000_s42455" name="Equation" r:id="rId4" imgW="1155700" imgH="241300" progId="Equation.3">
+                <p:oleObj name="Equation" r:id="rId3" imgW="1155700" imgH="241300" progId="Equation.3">
                   <p:embed/>
                 </p:oleObj>
               </mc:Choice>
               <mc:Fallback>
-                <p:oleObj name="Equation" r:id="rId4" imgW="1155700" imgH="241300" progId="Equation.3">
+                <p:oleObj name="Equation" r:id="rId3" imgW="1155700" imgH="241300" progId="Equation.3">
                   <p:embed/>
                   <p:pic>
                     <p:nvPicPr>
@@ -28538,7 +28533,7 @@
                       <p:nvPr/>
                     </p:nvPicPr>
                     <p:blipFill>
-                      <a:blip r:embed="rId5"/>
+                      <a:blip r:embed="rId4"/>
                       <a:stretch>
                         <a:fillRect/>
                       </a:stretch>
@@ -28639,12 +28634,12 @@
           <a:graphicData uri="http://schemas.openxmlformats.org/presentationml/2006/ole">
             <mc:AlternateContent xmlns:mc="http://schemas.openxmlformats.org/markup-compatibility/2006">
               <mc:Choice xmlns:v="urn:schemas-microsoft-com:vml" Requires="v">
-                <p:oleObj spid="_x0000_s42456" name="Equation" r:id="rId6" imgW="1054100" imgH="228600" progId="Equation.3">
+                <p:oleObj name="Equation" r:id="rId5" imgW="1054100" imgH="228600" progId="Equation.3">
                   <p:embed/>
                 </p:oleObj>
               </mc:Choice>
               <mc:Fallback>
-                <p:oleObj name="Equation" r:id="rId6" imgW="1054100" imgH="228600" progId="Equation.3">
+                <p:oleObj name="Equation" r:id="rId5" imgW="1054100" imgH="228600" progId="Equation.3">
                   <p:embed/>
                   <p:pic>
                     <p:nvPicPr>
@@ -28653,7 +28648,7 @@
                       <p:nvPr/>
                     </p:nvPicPr>
                     <p:blipFill>
-                      <a:blip r:embed="rId7"/>
+                      <a:blip r:embed="rId6"/>
                       <a:stretch>
                         <a:fillRect/>
                       </a:stretch>
@@ -28725,12 +28720,12 @@
           <a:graphicData uri="http://schemas.openxmlformats.org/presentationml/2006/ole">
             <mc:AlternateContent xmlns:mc="http://schemas.openxmlformats.org/markup-compatibility/2006">
               <mc:Choice xmlns:v="urn:schemas-microsoft-com:vml" Requires="v">
-                <p:oleObj spid="_x0000_s42457" name="Equation" r:id="rId8" imgW="1422400" imgH="203200" progId="Equation.3">
+                <p:oleObj name="Equation" r:id="rId7" imgW="1422400" imgH="203200" progId="Equation.3">
                   <p:embed/>
                 </p:oleObj>
               </mc:Choice>
               <mc:Fallback>
-                <p:oleObj name="Equation" r:id="rId8" imgW="1422400" imgH="203200" progId="Equation.3">
+                <p:oleObj name="Equation" r:id="rId7" imgW="1422400" imgH="203200" progId="Equation.3">
                   <p:embed/>
                   <p:pic>
                     <p:nvPicPr>
@@ -28739,7 +28734,7 @@
                       <p:nvPr/>
                     </p:nvPicPr>
                     <p:blipFill>
-                      <a:blip r:embed="rId9"/>
+                      <a:blip r:embed="rId8"/>
                       <a:stretch>
                         <a:fillRect/>
                       </a:stretch>
@@ -28811,12 +28806,12 @@
           <a:graphicData uri="http://schemas.openxmlformats.org/presentationml/2006/ole">
             <mc:AlternateContent xmlns:mc="http://schemas.openxmlformats.org/markup-compatibility/2006">
               <mc:Choice xmlns:v="urn:schemas-microsoft-com:vml" Requires="v">
-                <p:oleObj spid="_x0000_s42458" name="Equation" r:id="rId10" imgW="1155700" imgH="203200" progId="Equation.3">
+                <p:oleObj name="Equation" r:id="rId9" imgW="1155700" imgH="203200" progId="Equation.3">
                   <p:embed/>
                 </p:oleObj>
               </mc:Choice>
               <mc:Fallback>
-                <p:oleObj name="Equation" r:id="rId10" imgW="1155700" imgH="203200" progId="Equation.3">
+                <p:oleObj name="Equation" r:id="rId9" imgW="1155700" imgH="203200" progId="Equation.3">
                   <p:embed/>
                   <p:pic>
                     <p:nvPicPr>
@@ -28825,7 +28820,7 @@
                       <p:nvPr/>
                     </p:nvPicPr>
                     <p:blipFill>
-                      <a:blip r:embed="rId11"/>
+                      <a:blip r:embed="rId10"/>
                       <a:stretch>
                         <a:fillRect/>
                       </a:stretch>
@@ -28855,7 +28850,7 @@
           <p:nvPr/>
         </p:nvPicPr>
         <p:blipFill rotWithShape="1">
-          <a:blip r:embed="rId12"/>
+          <a:blip r:embed="rId11"/>
           <a:srcRect l="5062" t="5872" b="10417"/>
           <a:stretch/>
         </p:blipFill>
@@ -29257,12 +29252,12 @@
           <a:graphicData uri="http://schemas.openxmlformats.org/presentationml/2006/ole">
             <mc:AlternateContent xmlns:mc="http://schemas.openxmlformats.org/markup-compatibility/2006">
               <mc:Choice xmlns:v="urn:schemas-microsoft-com:vml" Requires="v">
-                <p:oleObj spid="_x0000_s45392" name="Equation" r:id="rId4" imgW="1333500" imgH="457200" progId="Equation.3">
+                <p:oleObj name="Equation" r:id="rId3" imgW="1333500" imgH="457200" progId="Equation.3">
                   <p:embed/>
                 </p:oleObj>
               </mc:Choice>
               <mc:Fallback>
-                <p:oleObj name="Equation" r:id="rId4" imgW="1333500" imgH="457200" progId="Equation.3">
+                <p:oleObj name="Equation" r:id="rId3" imgW="1333500" imgH="457200" progId="Equation.3">
                   <p:embed/>
                   <p:pic>
                     <p:nvPicPr>
@@ -29271,7 +29266,7 @@
                       <p:nvPr/>
                     </p:nvPicPr>
                     <p:blipFill>
-                      <a:blip r:embed="rId5"/>
+                      <a:blip r:embed="rId4"/>
                       <a:stretch>
                         <a:fillRect/>
                       </a:stretch>
@@ -29314,12 +29309,12 @@
           <a:graphicData uri="http://schemas.openxmlformats.org/presentationml/2006/ole">
             <mc:AlternateContent xmlns:mc="http://schemas.openxmlformats.org/markup-compatibility/2006">
               <mc:Choice xmlns:v="urn:schemas-microsoft-com:vml" Requires="v">
-                <p:oleObj spid="_x0000_s45393" name="Equation" r:id="rId6" imgW="1930400" imgH="457200" progId="Equation.3">
+                <p:oleObj name="Equation" r:id="rId5" imgW="1930400" imgH="457200" progId="Equation.3">
                   <p:embed/>
                 </p:oleObj>
               </mc:Choice>
               <mc:Fallback>
-                <p:oleObj name="Equation" r:id="rId6" imgW="1930400" imgH="457200" progId="Equation.3">
+                <p:oleObj name="Equation" r:id="rId5" imgW="1930400" imgH="457200" progId="Equation.3">
                   <p:embed/>
                   <p:pic>
                     <p:nvPicPr>
@@ -29328,7 +29323,7 @@
                       <p:nvPr/>
                     </p:nvPicPr>
                     <p:blipFill>
-                      <a:blip r:embed="rId7"/>
+                      <a:blip r:embed="rId6"/>
                       <a:stretch>
                         <a:fillRect/>
                       </a:stretch>
@@ -29445,12 +29440,12 @@
           <a:graphicData uri="http://schemas.openxmlformats.org/presentationml/2006/ole">
             <mc:AlternateContent xmlns:mc="http://schemas.openxmlformats.org/markup-compatibility/2006">
               <mc:Choice xmlns:v="urn:schemas-microsoft-com:vml" Requires="v">
-                <p:oleObj spid="_x0000_s45394" name="Equation" r:id="rId8" imgW="1041400" imgH="330200" progId="Equation.3">
+                <p:oleObj name="Equation" r:id="rId7" imgW="1041400" imgH="330200" progId="Equation.3">
                   <p:embed/>
                 </p:oleObj>
               </mc:Choice>
               <mc:Fallback>
-                <p:oleObj name="Equation" r:id="rId8" imgW="1041400" imgH="330200" progId="Equation.3">
+                <p:oleObj name="Equation" r:id="rId7" imgW="1041400" imgH="330200" progId="Equation.3">
                   <p:embed/>
                   <p:pic>
                     <p:nvPicPr>
@@ -29459,7 +29454,7 @@
                       <p:nvPr/>
                     </p:nvPicPr>
                     <p:blipFill>
-                      <a:blip r:embed="rId9"/>
+                      <a:blip r:embed="rId8"/>
                       <a:stretch>
                         <a:fillRect/>
                       </a:stretch>
@@ -31342,8 +31337,8 @@
           </a:p>
         </p:txBody>
       </p:sp>
-      <mc:AlternateContent xmlns:mc="http://schemas.openxmlformats.org/markup-compatibility/2006">
-        <mc:Choice xmlns:a14="http://schemas.microsoft.com/office/drawing/2010/main" Requires="a14">
+      <mc:AlternateContent xmlns:mc="http://schemas.openxmlformats.org/markup-compatibility/2006" xmlns:a14="http://schemas.microsoft.com/office/drawing/2010/main">
+        <mc:Choice Requires="a14">
           <p:sp>
             <p:nvSpPr>
               <p:cNvPr id="6" name="TextBox 5">
@@ -31472,7 +31467,7 @@
             </p:txBody>
           </p:sp>
         </mc:Choice>
-        <mc:Fallback>
+        <mc:Fallback xmlns="">
           <p:sp>
             <p:nvSpPr>
               <p:cNvPr id="6" name="TextBox 5">
@@ -31973,8 +31968,8 @@
           </a:p>
         </p:txBody>
       </p:sp>
-      <mc:AlternateContent xmlns:mc="http://schemas.openxmlformats.org/markup-compatibility/2006">
-        <mc:Choice xmlns:a14="http://schemas.microsoft.com/office/drawing/2010/main" Requires="a14">
+      <mc:AlternateContent xmlns:mc="http://schemas.openxmlformats.org/markup-compatibility/2006" xmlns:a14="http://schemas.microsoft.com/office/drawing/2010/main">
+        <mc:Choice Requires="a14">
           <p:sp>
             <p:nvSpPr>
               <p:cNvPr id="9" name="TextBox 8">
@@ -32116,7 +32111,7 @@
             </p:txBody>
           </p:sp>
         </mc:Choice>
-        <mc:Fallback>
+        <mc:Fallback xmlns="">
           <p:sp>
             <p:nvSpPr>
               <p:cNvPr id="9" name="TextBox 8">
@@ -32448,8 +32443,8 @@
           <a:effectLst/>
         </p:spPr>
       </p:cxnSp>
-      <mc:AlternateContent xmlns:mc="http://schemas.openxmlformats.org/markup-compatibility/2006">
-        <mc:Choice xmlns:a14="http://schemas.microsoft.com/office/drawing/2010/main" Requires="a14">
+      <mc:AlternateContent xmlns:mc="http://schemas.openxmlformats.org/markup-compatibility/2006" xmlns:a14="http://schemas.microsoft.com/office/drawing/2010/main">
+        <mc:Choice Requires="a14">
           <p:sp>
             <p:nvSpPr>
               <p:cNvPr id="10" name="TextBox 9">
@@ -32591,7 +32586,7 @@
             </p:txBody>
           </p:sp>
         </mc:Choice>
-        <mc:Fallback>
+        <mc:Fallback xmlns="">
           <p:sp>
             <p:nvSpPr>
               <p:cNvPr id="10" name="TextBox 9">
@@ -32710,12 +32705,12 @@
           <a:graphicData uri="http://schemas.openxmlformats.org/presentationml/2006/ole">
             <mc:AlternateContent xmlns:mc="http://schemas.openxmlformats.org/markup-compatibility/2006">
               <mc:Choice xmlns:v="urn:schemas-microsoft-com:vml" Requires="v">
-                <p:oleObj spid="_x0000_s77066" name="Equation" r:id="rId3" imgW="1714500" imgH="469900" progId="Equation.3">
+                <p:oleObj name="Equation" r:id="rId2" imgW="1714500" imgH="469900" progId="Equation.3">
                   <p:embed/>
                 </p:oleObj>
               </mc:Choice>
               <mc:Fallback>
-                <p:oleObj name="Equation" r:id="rId3" imgW="1714500" imgH="469900" progId="Equation.3">
+                <p:oleObj name="Equation" r:id="rId2" imgW="1714500" imgH="469900" progId="Equation.3">
                   <p:embed/>
                   <p:pic>
                     <p:nvPicPr>
@@ -32724,7 +32719,7 @@
                       <p:nvPr/>
                     </p:nvPicPr>
                     <p:blipFill>
-                      <a:blip r:embed="rId4"/>
+                      <a:blip r:embed="rId3"/>
                       <a:stretch>
                         <a:fillRect/>
                       </a:stretch>
@@ -32767,12 +32762,12 @@
           <a:graphicData uri="http://schemas.openxmlformats.org/presentationml/2006/ole">
             <mc:AlternateContent xmlns:mc="http://schemas.openxmlformats.org/markup-compatibility/2006">
               <mc:Choice xmlns:v="urn:schemas-microsoft-com:vml" Requires="v">
-                <p:oleObj spid="_x0000_s77067" name="Equation" r:id="rId5" imgW="558800" imgH="444500" progId="Equation.3">
+                <p:oleObj name="Equation" r:id="rId4" imgW="558800" imgH="444500" progId="Equation.3">
                   <p:embed/>
                 </p:oleObj>
               </mc:Choice>
               <mc:Fallback>
-                <p:oleObj name="Equation" r:id="rId5" imgW="558800" imgH="444500" progId="Equation.3">
+                <p:oleObj name="Equation" r:id="rId4" imgW="558800" imgH="444500" progId="Equation.3">
                   <p:embed/>
                   <p:pic>
                     <p:nvPicPr>
@@ -32781,7 +32776,7 @@
                       <p:nvPr/>
                     </p:nvPicPr>
                     <p:blipFill>
-                      <a:blip r:embed="rId6"/>
+                      <a:blip r:embed="rId5"/>
                       <a:stretch>
                         <a:fillRect/>
                       </a:stretch>
@@ -32824,12 +32819,12 @@
           <a:graphicData uri="http://schemas.openxmlformats.org/presentationml/2006/ole">
             <mc:AlternateContent xmlns:mc="http://schemas.openxmlformats.org/markup-compatibility/2006">
               <mc:Choice xmlns:v="urn:schemas-microsoft-com:vml" Requires="v">
-                <p:oleObj spid="_x0000_s77068" name="Equation" r:id="rId7" imgW="2565400" imgH="469900" progId="Equation.3">
+                <p:oleObj name="Equation" r:id="rId6" imgW="2565400" imgH="469900" progId="Equation.3">
                   <p:embed/>
                 </p:oleObj>
               </mc:Choice>
               <mc:Fallback>
-                <p:oleObj name="Equation" r:id="rId7" imgW="2565400" imgH="469900" progId="Equation.3">
+                <p:oleObj name="Equation" r:id="rId6" imgW="2565400" imgH="469900" progId="Equation.3">
                   <p:embed/>
                   <p:pic>
                     <p:nvPicPr>
@@ -32838,7 +32833,7 @@
                       <p:nvPr/>
                     </p:nvPicPr>
                     <p:blipFill>
-                      <a:blip r:embed="rId8"/>
+                      <a:blip r:embed="rId7"/>
                       <a:stretch>
                         <a:fillRect/>
                       </a:stretch>
@@ -34600,12 +34595,12 @@
           <a:graphicData uri="http://schemas.openxmlformats.org/presentationml/2006/ole">
             <mc:AlternateContent xmlns:mc="http://schemas.openxmlformats.org/markup-compatibility/2006">
               <mc:Choice xmlns:v="urn:schemas-microsoft-com:vml" Requires="v">
-                <p:oleObj spid="_x0000_s102437" name="Equation" r:id="rId3" imgW="1714500" imgH="469900" progId="Equation.3">
+                <p:oleObj name="Equation" r:id="rId2" imgW="1714500" imgH="469900" progId="Equation.3">
                   <p:embed/>
                 </p:oleObj>
               </mc:Choice>
               <mc:Fallback>
-                <p:oleObj name="Equation" r:id="rId3" imgW="1714500" imgH="469900" progId="Equation.3">
+                <p:oleObj name="Equation" r:id="rId2" imgW="1714500" imgH="469900" progId="Equation.3">
                   <p:embed/>
                   <p:pic>
                     <p:nvPicPr>
@@ -34614,7 +34609,7 @@
                       <p:nvPr/>
                     </p:nvPicPr>
                     <p:blipFill>
-                      <a:blip r:embed="rId4"/>
+                      <a:blip r:embed="rId3"/>
                       <a:stretch>
                         <a:fillRect/>
                       </a:stretch>
@@ -34651,12 +34646,12 @@
           <a:graphicData uri="http://schemas.openxmlformats.org/presentationml/2006/ole">
             <mc:AlternateContent xmlns:mc="http://schemas.openxmlformats.org/markup-compatibility/2006">
               <mc:Choice xmlns:v="urn:schemas-microsoft-com:vml" Requires="v">
-                <p:oleObj spid="_x0000_s102438" name="Equation" r:id="rId5" imgW="558800" imgH="444500" progId="Equation.3">
+                <p:oleObj name="Equation" r:id="rId4" imgW="558800" imgH="444500" progId="Equation.3">
                   <p:embed/>
                 </p:oleObj>
               </mc:Choice>
               <mc:Fallback>
-                <p:oleObj name="Equation" r:id="rId5" imgW="558800" imgH="444500" progId="Equation.3">
+                <p:oleObj name="Equation" r:id="rId4" imgW="558800" imgH="444500" progId="Equation.3">
                   <p:embed/>
                   <p:pic>
                     <p:nvPicPr>
@@ -34665,7 +34660,7 @@
                       <p:nvPr/>
                     </p:nvPicPr>
                     <p:blipFill>
-                      <a:blip r:embed="rId6"/>
+                      <a:blip r:embed="rId5"/>
                       <a:stretch>
                         <a:fillRect/>
                       </a:stretch>
@@ -34702,12 +34697,12 @@
           <a:graphicData uri="http://schemas.openxmlformats.org/presentationml/2006/ole">
             <mc:AlternateContent xmlns:mc="http://schemas.openxmlformats.org/markup-compatibility/2006">
               <mc:Choice xmlns:v="urn:schemas-microsoft-com:vml" Requires="v">
-                <p:oleObj spid="_x0000_s102439" name="Equation" r:id="rId7" imgW="2565400" imgH="469900" progId="Equation.3">
+                <p:oleObj name="Equation" r:id="rId6" imgW="2565400" imgH="469900" progId="Equation.3">
                   <p:embed/>
                 </p:oleObj>
               </mc:Choice>
               <mc:Fallback>
-                <p:oleObj name="Equation" r:id="rId7" imgW="2565400" imgH="469900" progId="Equation.3">
+                <p:oleObj name="Equation" r:id="rId6" imgW="2565400" imgH="469900" progId="Equation.3">
                   <p:embed/>
                   <p:pic>
                     <p:nvPicPr>
@@ -34716,7 +34711,7 @@
                       <p:nvPr/>
                     </p:nvPicPr>
                     <p:blipFill>
-                      <a:blip r:embed="rId8"/>
+                      <a:blip r:embed="rId7"/>
                       <a:stretch>
                         <a:fillRect/>
                       </a:stretch>
@@ -34753,12 +34748,12 @@
           <a:graphicData uri="http://schemas.openxmlformats.org/presentationml/2006/ole">
             <mc:AlternateContent xmlns:mc="http://schemas.openxmlformats.org/markup-compatibility/2006">
               <mc:Choice xmlns:v="urn:schemas-microsoft-com:vml" Requires="v">
-                <p:oleObj spid="_x0000_s102440" name="Equation" r:id="rId9" imgW="1790700" imgH="457200" progId="Equation.3">
+                <p:oleObj name="Equation" r:id="rId8" imgW="1790700" imgH="457200" progId="Equation.3">
                   <p:embed/>
                 </p:oleObj>
               </mc:Choice>
               <mc:Fallback>
-                <p:oleObj name="Equation" r:id="rId9" imgW="1790700" imgH="457200" progId="Equation.3">
+                <p:oleObj name="Equation" r:id="rId8" imgW="1790700" imgH="457200" progId="Equation.3">
                   <p:embed/>
                   <p:pic>
                     <p:nvPicPr>
@@ -34767,7 +34762,7 @@
                       <p:nvPr/>
                     </p:nvPicPr>
                     <p:blipFill>
-                      <a:blip r:embed="rId10"/>
+                      <a:blip r:embed="rId9"/>
                       <a:stretch>
                         <a:fillRect/>
                       </a:stretch>
@@ -34922,12 +34917,12 @@
           <a:graphicData uri="http://schemas.openxmlformats.org/presentationml/2006/ole">
             <mc:AlternateContent xmlns:mc="http://schemas.openxmlformats.org/markup-compatibility/2006">
               <mc:Choice xmlns:v="urn:schemas-microsoft-com:vml" Requires="v">
-                <p:oleObj spid="_x0000_s78916" name="Equation" r:id="rId3" imgW="2273300" imgH="457200" progId="Equation.3">
+                <p:oleObj name="Equation" r:id="rId2" imgW="2273300" imgH="457200" progId="Equation.3">
                   <p:embed/>
                 </p:oleObj>
               </mc:Choice>
               <mc:Fallback>
-                <p:oleObj name="Equation" r:id="rId3" imgW="2273300" imgH="457200" progId="Equation.3">
+                <p:oleObj name="Equation" r:id="rId2" imgW="2273300" imgH="457200" progId="Equation.3">
                   <p:embed/>
                   <p:pic>
                     <p:nvPicPr>
@@ -34938,7 +34933,7 @@
                       <p:nvPr/>
                     </p:nvPicPr>
                     <p:blipFill>
-                      <a:blip r:embed="rId4"/>
+                      <a:blip r:embed="rId3"/>
                       <a:srcRect/>
                       <a:stretch>
                         <a:fillRect/>
@@ -34955,7 +34950,7 @@
                       <a:noFill/>
                       <a:extLst>
                         <a:ext uri="{909E8E84-426E-40dd-AFC4-6F175D3DCCD1}">
-                          <a14:hiddenFill xmlns:a14="http://schemas.microsoft.com/office/drawing/2010/main" xmlns="">
+                          <a14:hiddenFill xmlns="" xmlns:a14="http://schemas.microsoft.com/office/drawing/2010/main">
                             <a:solidFill>
                               <a:srgbClr val="FFFFFF"/>
                             </a:solidFill>
@@ -35077,12 +35072,12 @@
           <a:graphicData uri="http://schemas.openxmlformats.org/presentationml/2006/ole">
             <mc:AlternateContent xmlns:mc="http://schemas.openxmlformats.org/markup-compatibility/2006">
               <mc:Choice xmlns:v="urn:schemas-microsoft-com:vml" Requires="v">
-                <p:oleObj spid="_x0000_s79999" name="Equation" r:id="rId3" imgW="2273300" imgH="457200" progId="Equation.3">
+                <p:oleObj name="Equation" r:id="rId2" imgW="2273300" imgH="457200" progId="Equation.3">
                   <p:embed/>
                 </p:oleObj>
               </mc:Choice>
               <mc:Fallback>
-                <p:oleObj name="Equation" r:id="rId3" imgW="2273300" imgH="457200" progId="Equation.3">
+                <p:oleObj name="Equation" r:id="rId2" imgW="2273300" imgH="457200" progId="Equation.3">
                   <p:embed/>
                   <p:pic>
                     <p:nvPicPr>
@@ -35093,7 +35088,7 @@
                       <p:nvPr/>
                     </p:nvPicPr>
                     <p:blipFill>
-                      <a:blip r:embed="rId4"/>
+                      <a:blip r:embed="rId3"/>
                       <a:srcRect/>
                       <a:stretch>
                         <a:fillRect/>
@@ -35110,7 +35105,7 @@
                       <a:noFill/>
                       <a:extLst>
                         <a:ext uri="{909E8E84-426E-40dd-AFC4-6F175D3DCCD1}">
-                          <a14:hiddenFill xmlns:a14="http://schemas.microsoft.com/office/drawing/2010/main" xmlns="">
+                          <a14:hiddenFill xmlns="" xmlns:a14="http://schemas.microsoft.com/office/drawing/2010/main">
                             <a:solidFill>
                               <a:srgbClr val="FFFFFF"/>
                             </a:solidFill>
@@ -35147,12 +35142,12 @@
           <a:graphicData uri="http://schemas.openxmlformats.org/presentationml/2006/ole">
             <mc:AlternateContent xmlns:mc="http://schemas.openxmlformats.org/markup-compatibility/2006">
               <mc:Choice xmlns:v="urn:schemas-microsoft-com:vml" Requires="v">
-                <p:oleObj spid="_x0000_s80000" name="Equation" r:id="rId5" imgW="2095500" imgH="228600" progId="Equation.3">
+                <p:oleObj name="Equation" r:id="rId4" imgW="2095500" imgH="228600" progId="Equation.3">
                   <p:embed/>
                 </p:oleObj>
               </mc:Choice>
               <mc:Fallback>
-                <p:oleObj name="Equation" r:id="rId5" imgW="2095500" imgH="228600" progId="Equation.3">
+                <p:oleObj name="Equation" r:id="rId4" imgW="2095500" imgH="228600" progId="Equation.3">
                   <p:embed/>
                   <p:pic>
                     <p:nvPicPr>
@@ -35163,7 +35158,7 @@
                       <p:nvPr/>
                     </p:nvPicPr>
                     <p:blipFill>
-                      <a:blip r:embed="rId6"/>
+                      <a:blip r:embed="rId5"/>
                       <a:srcRect/>
                       <a:stretch>
                         <a:fillRect/>
@@ -35180,7 +35175,7 @@
                       <a:noFill/>
                       <a:extLst>
                         <a:ext uri="{909E8E84-426E-40dd-AFC4-6F175D3DCCD1}">
-                          <a14:hiddenFill xmlns:a14="http://schemas.microsoft.com/office/drawing/2010/main" xmlns="">
+                          <a14:hiddenFill xmlns="" xmlns:a14="http://schemas.microsoft.com/office/drawing/2010/main">
                             <a:solidFill>
                               <a:srgbClr val="FFFFFF"/>
                             </a:solidFill>
@@ -35642,12 +35637,12 @@
           <a:graphicData uri="http://schemas.openxmlformats.org/presentationml/2006/ole">
             <mc:AlternateContent xmlns:mc="http://schemas.openxmlformats.org/markup-compatibility/2006">
               <mc:Choice xmlns:v="urn:schemas-microsoft-com:vml" Requires="v">
-                <p:oleObj spid="_x0000_s81141" name="Equation" r:id="rId3" imgW="1600200" imgH="330200" progId="Equation.3">
+                <p:oleObj name="Equation" r:id="rId2" imgW="1600200" imgH="330200" progId="Equation.3">
                   <p:embed/>
                 </p:oleObj>
               </mc:Choice>
               <mc:Fallback>
-                <p:oleObj name="Equation" r:id="rId3" imgW="1600200" imgH="330200" progId="Equation.3">
+                <p:oleObj name="Equation" r:id="rId2" imgW="1600200" imgH="330200" progId="Equation.3">
                   <p:embed/>
                   <p:pic>
                     <p:nvPicPr>
@@ -35656,7 +35651,7 @@
                       <p:nvPr/>
                     </p:nvPicPr>
                     <p:blipFill>
-                      <a:blip r:embed="rId4"/>
+                      <a:blip r:embed="rId3"/>
                       <a:stretch>
                         <a:fillRect/>
                       </a:stretch>
@@ -35699,12 +35694,12 @@
           <a:graphicData uri="http://schemas.openxmlformats.org/presentationml/2006/ole">
             <mc:AlternateContent xmlns:mc="http://schemas.openxmlformats.org/markup-compatibility/2006">
               <mc:Choice xmlns:v="urn:schemas-microsoft-com:vml" Requires="v">
-                <p:oleObj spid="_x0000_s81142" name="Equation" r:id="rId5" imgW="2095500" imgH="228600" progId="Equation.3">
+                <p:oleObj name="Equation" r:id="rId4" imgW="2095500" imgH="228600" progId="Equation.3">
                   <p:embed/>
                 </p:oleObj>
               </mc:Choice>
               <mc:Fallback>
-                <p:oleObj name="Equation" r:id="rId5" imgW="2095500" imgH="228600" progId="Equation.3">
+                <p:oleObj name="Equation" r:id="rId4" imgW="2095500" imgH="228600" progId="Equation.3">
                   <p:embed/>
                   <p:pic>
                     <p:nvPicPr>
@@ -35715,7 +35710,7 @@
                       <p:nvPr/>
                     </p:nvPicPr>
                     <p:blipFill>
-                      <a:blip r:embed="rId6"/>
+                      <a:blip r:embed="rId5"/>
                       <a:srcRect/>
                       <a:stretch>
                         <a:fillRect/>
@@ -35732,7 +35727,7 @@
                       <a:noFill/>
                       <a:extLst>
                         <a:ext uri="{909E8E84-426E-40dd-AFC4-6F175D3DCCD1}">
-                          <a14:hiddenFill xmlns:a14="http://schemas.microsoft.com/office/drawing/2010/main" xmlns="">
+                          <a14:hiddenFill xmlns="" xmlns:a14="http://schemas.microsoft.com/office/drawing/2010/main">
                             <a:solidFill>
                               <a:srgbClr val="FFFFFF"/>
                             </a:solidFill>
@@ -35800,12 +35795,12 @@
           <a:graphicData uri="http://schemas.openxmlformats.org/presentationml/2006/ole">
             <mc:AlternateContent xmlns:mc="http://schemas.openxmlformats.org/markup-compatibility/2006">
               <mc:Choice xmlns:v="urn:schemas-microsoft-com:vml" Requires="v">
-                <p:oleObj spid="_x0000_s81143" name="Equation" r:id="rId7" imgW="939800" imgH="228600" progId="Equation.3">
+                <p:oleObj name="Equation" r:id="rId6" imgW="939800" imgH="228600" progId="Equation.3">
                   <p:embed/>
                 </p:oleObj>
               </mc:Choice>
               <mc:Fallback>
-                <p:oleObj name="Equation" r:id="rId7" imgW="939800" imgH="228600" progId="Equation.3">
+                <p:oleObj name="Equation" r:id="rId6" imgW="939800" imgH="228600" progId="Equation.3">
                   <p:embed/>
                   <p:pic>
                     <p:nvPicPr>
@@ -35816,7 +35811,7 @@
                       <p:nvPr/>
                     </p:nvPicPr>
                     <p:blipFill>
-                      <a:blip r:embed="rId8"/>
+                      <a:blip r:embed="rId7"/>
                       <a:srcRect/>
                       <a:stretch>
                         <a:fillRect/>
@@ -35833,7 +35828,7 @@
                       <a:noFill/>
                       <a:extLst>
                         <a:ext uri="{909E8E84-426E-40dd-AFC4-6F175D3DCCD1}">
-                          <a14:hiddenFill xmlns:a14="http://schemas.microsoft.com/office/drawing/2010/main" xmlns="">
+                          <a14:hiddenFill xmlns="" xmlns:a14="http://schemas.microsoft.com/office/drawing/2010/main">
                             <a:solidFill>
                               <a:srgbClr val="FFFFFF"/>
                             </a:solidFill>
@@ -35928,12 +35923,12 @@
           <a:graphicData uri="http://schemas.openxmlformats.org/presentationml/2006/ole">
             <mc:AlternateContent xmlns:mc="http://schemas.openxmlformats.org/markup-compatibility/2006">
               <mc:Choice xmlns:v="urn:schemas-microsoft-com:vml" Requires="v">
-                <p:oleObj spid="_x0000_s81144" name="Equation" r:id="rId9" imgW="1485900" imgH="215900" progId="Equation.3">
+                <p:oleObj name="Equation" r:id="rId8" imgW="1485900" imgH="215900" progId="Equation.3">
                   <p:embed/>
                 </p:oleObj>
               </mc:Choice>
               <mc:Fallback>
-                <p:oleObj name="Equation" r:id="rId9" imgW="1485900" imgH="215900" progId="Equation.3">
+                <p:oleObj name="Equation" r:id="rId8" imgW="1485900" imgH="215900" progId="Equation.3">
                   <p:embed/>
                   <p:pic>
                     <p:nvPicPr>
@@ -35944,7 +35939,7 @@
                       <p:nvPr/>
                     </p:nvPicPr>
                     <p:blipFill>
-                      <a:blip r:embed="rId10"/>
+                      <a:blip r:embed="rId9"/>
                       <a:srcRect/>
                       <a:stretch>
                         <a:fillRect/>
@@ -35961,7 +35956,7 @@
                       <a:noFill/>
                       <a:extLst>
                         <a:ext uri="{909E8E84-426E-40dd-AFC4-6F175D3DCCD1}">
-                          <a14:hiddenFill xmlns:a14="http://schemas.microsoft.com/office/drawing/2010/main" xmlns="">
+                          <a14:hiddenFill xmlns="" xmlns:a14="http://schemas.microsoft.com/office/drawing/2010/main">
                             <a:solidFill>
                               <a:srgbClr val="FFFFFF"/>
                             </a:solidFill>
@@ -36050,12 +36045,12 @@
           <a:graphicData uri="http://schemas.openxmlformats.org/presentationml/2006/ole">
             <mc:AlternateContent xmlns:mc="http://schemas.openxmlformats.org/markup-compatibility/2006">
               <mc:Choice xmlns:v="urn:schemas-microsoft-com:vml" Requires="v">
-                <p:oleObj spid="_x0000_s83005" name="Equation" r:id="rId3" imgW="1485900" imgH="215900" progId="Equation.3">
+                <p:oleObj name="Equation" r:id="rId2" imgW="1485900" imgH="215900" progId="Equation.3">
                   <p:embed/>
                 </p:oleObj>
               </mc:Choice>
               <mc:Fallback>
-                <p:oleObj name="Equation" r:id="rId3" imgW="1485900" imgH="215900" progId="Equation.3">
+                <p:oleObj name="Equation" r:id="rId2" imgW="1485900" imgH="215900" progId="Equation.3">
                   <p:embed/>
                   <p:pic>
                     <p:nvPicPr>
@@ -36066,7 +36061,7 @@
                       <p:nvPr/>
                     </p:nvPicPr>
                     <p:blipFill>
-                      <a:blip r:embed="rId4"/>
+                      <a:blip r:embed="rId3"/>
                       <a:srcRect/>
                       <a:stretch>
                         <a:fillRect/>
@@ -36083,7 +36078,7 @@
                       <a:noFill/>
                       <a:extLst>
                         <a:ext uri="{909E8E84-426E-40dd-AFC4-6F175D3DCCD1}">
-                          <a14:hiddenFill xmlns:a14="http://schemas.microsoft.com/office/drawing/2010/main" xmlns="">
+                          <a14:hiddenFill xmlns="" xmlns:a14="http://schemas.microsoft.com/office/drawing/2010/main">
                             <a:solidFill>
                               <a:srgbClr val="FFFFFF"/>
                             </a:solidFill>
@@ -36554,12 +36549,12 @@
           <a:graphicData uri="http://schemas.openxmlformats.org/presentationml/2006/ole">
             <mc:AlternateContent xmlns:mc="http://schemas.openxmlformats.org/markup-compatibility/2006">
               <mc:Choice xmlns:v="urn:schemas-microsoft-com:vml" Requires="v">
-                <p:oleObj spid="_x0000_s84027" name="Equation" r:id="rId3" imgW="1485900" imgH="215900" progId="Equation.3">
+                <p:oleObj name="Equation" r:id="rId2" imgW="1485900" imgH="215900" progId="Equation.3">
                   <p:embed/>
                 </p:oleObj>
               </mc:Choice>
               <mc:Fallback>
-                <p:oleObj name="Equation" r:id="rId3" imgW="1485900" imgH="215900" progId="Equation.3">
+                <p:oleObj name="Equation" r:id="rId2" imgW="1485900" imgH="215900" progId="Equation.3">
                   <p:embed/>
                   <p:pic>
                     <p:nvPicPr>
@@ -36570,7 +36565,7 @@
                       <p:nvPr/>
                     </p:nvPicPr>
                     <p:blipFill>
-                      <a:blip r:embed="rId4"/>
+                      <a:blip r:embed="rId3"/>
                       <a:srcRect/>
                       <a:stretch>
                         <a:fillRect/>
@@ -36587,7 +36582,7 @@
                       <a:noFill/>
                       <a:extLst>
                         <a:ext uri="{909E8E84-426E-40dd-AFC4-6F175D3DCCD1}">
-                          <a14:hiddenFill xmlns:a14="http://schemas.microsoft.com/office/drawing/2010/main" xmlns="">
+                          <a14:hiddenFill xmlns="" xmlns:a14="http://schemas.microsoft.com/office/drawing/2010/main">
                             <a:solidFill>
                               <a:srgbClr val="FFFFFF"/>
                             </a:solidFill>
@@ -36839,7 +36834,7 @@
           <p:nvPr/>
         </p:nvPicPr>
         <p:blipFill rotWithShape="1">
-          <a:blip r:embed="rId5"/>
+          <a:blip r:embed="rId4"/>
           <a:srcRect l="12482" t="12716" r="15913" b="10577"/>
           <a:stretch/>
         </p:blipFill>
@@ -37199,12 +37194,12 @@
           <a:graphicData uri="http://schemas.openxmlformats.org/presentationml/2006/ole">
             <mc:AlternateContent xmlns:mc="http://schemas.openxmlformats.org/markup-compatibility/2006">
               <mc:Choice xmlns:v="urn:schemas-microsoft-com:vml" Requires="v">
-                <p:oleObj spid="_x0000_s97442" name="Equation" r:id="rId3" imgW="1600200" imgH="330200" progId="Equation.3">
+                <p:oleObj name="Equation" r:id="rId2" imgW="1600200" imgH="330200" progId="Equation.3">
                   <p:embed/>
                 </p:oleObj>
               </mc:Choice>
               <mc:Fallback>
-                <p:oleObj name="Equation" r:id="rId3" imgW="1600200" imgH="330200" progId="Equation.3">
+                <p:oleObj name="Equation" r:id="rId2" imgW="1600200" imgH="330200" progId="Equation.3">
                   <p:embed/>
                   <p:pic>
                     <p:nvPicPr>
@@ -37213,7 +37208,7 @@
                       <p:nvPr/>
                     </p:nvPicPr>
                     <p:blipFill>
-                      <a:blip r:embed="rId4"/>
+                      <a:blip r:embed="rId3"/>
                       <a:stretch>
                         <a:fillRect/>
                       </a:stretch>
@@ -37256,12 +37251,12 @@
           <a:graphicData uri="http://schemas.openxmlformats.org/presentationml/2006/ole">
             <mc:AlternateContent xmlns:mc="http://schemas.openxmlformats.org/markup-compatibility/2006">
               <mc:Choice xmlns:v="urn:schemas-microsoft-com:vml" Requires="v">
-                <p:oleObj spid="_x0000_s97443" name="Equation" r:id="rId5" imgW="2095500" imgH="228600" progId="Equation.3">
+                <p:oleObj name="Equation" r:id="rId4" imgW="2095500" imgH="228600" progId="Equation.3">
                   <p:embed/>
                 </p:oleObj>
               </mc:Choice>
               <mc:Fallback>
-                <p:oleObj name="Equation" r:id="rId5" imgW="2095500" imgH="228600" progId="Equation.3">
+                <p:oleObj name="Equation" r:id="rId4" imgW="2095500" imgH="228600" progId="Equation.3">
                   <p:embed/>
                   <p:pic>
                     <p:nvPicPr>
@@ -37272,7 +37267,7 @@
                       <p:nvPr/>
                     </p:nvPicPr>
                     <p:blipFill>
-                      <a:blip r:embed="rId6"/>
+                      <a:blip r:embed="rId5"/>
                       <a:srcRect/>
                       <a:stretch>
                         <a:fillRect/>
@@ -37289,7 +37284,7 @@
                       <a:noFill/>
                       <a:extLst>
                         <a:ext uri="{909E8E84-426E-40dd-AFC4-6F175D3DCCD1}">
-                          <a14:hiddenFill xmlns:a14="http://schemas.microsoft.com/office/drawing/2010/main" xmlns="">
+                          <a14:hiddenFill xmlns="" xmlns:a14="http://schemas.microsoft.com/office/drawing/2010/main">
                             <a:solidFill>
                               <a:srgbClr val="FFFFFF"/>
                             </a:solidFill>
@@ -37357,12 +37352,12 @@
           <a:graphicData uri="http://schemas.openxmlformats.org/presentationml/2006/ole">
             <mc:AlternateContent xmlns:mc="http://schemas.openxmlformats.org/markup-compatibility/2006">
               <mc:Choice xmlns:v="urn:schemas-microsoft-com:vml" Requires="v">
-                <p:oleObj spid="_x0000_s97444" name="Equation" r:id="rId7" imgW="939800" imgH="228600" progId="Equation.3">
+                <p:oleObj name="Equation" r:id="rId6" imgW="939800" imgH="228600" progId="Equation.3">
                   <p:embed/>
                 </p:oleObj>
               </mc:Choice>
               <mc:Fallback>
-                <p:oleObj name="Equation" r:id="rId7" imgW="939800" imgH="228600" progId="Equation.3">
+                <p:oleObj name="Equation" r:id="rId6" imgW="939800" imgH="228600" progId="Equation.3">
                   <p:embed/>
                   <p:pic>
                     <p:nvPicPr>
@@ -37373,7 +37368,7 @@
                       <p:nvPr/>
                     </p:nvPicPr>
                     <p:blipFill>
-                      <a:blip r:embed="rId8"/>
+                      <a:blip r:embed="rId7"/>
                       <a:srcRect/>
                       <a:stretch>
                         <a:fillRect/>
@@ -37390,7 +37385,7 @@
                       <a:noFill/>
                       <a:extLst>
                         <a:ext uri="{909E8E84-426E-40dd-AFC4-6F175D3DCCD1}">
-                          <a14:hiddenFill xmlns:a14="http://schemas.microsoft.com/office/drawing/2010/main" xmlns="">
+                          <a14:hiddenFill xmlns="" xmlns:a14="http://schemas.microsoft.com/office/drawing/2010/main">
                             <a:solidFill>
                               <a:srgbClr val="FFFFFF"/>
                             </a:solidFill>
@@ -37485,12 +37480,12 @@
           <a:graphicData uri="http://schemas.openxmlformats.org/presentationml/2006/ole">
             <mc:AlternateContent xmlns:mc="http://schemas.openxmlformats.org/markup-compatibility/2006">
               <mc:Choice xmlns:v="urn:schemas-microsoft-com:vml" Requires="v">
-                <p:oleObj spid="_x0000_s97445" name="Equation" r:id="rId9" imgW="1485900" imgH="215900" progId="Equation.3">
+                <p:oleObj name="Equation" r:id="rId8" imgW="1485900" imgH="215900" progId="Equation.3">
                   <p:embed/>
                 </p:oleObj>
               </mc:Choice>
               <mc:Fallback>
-                <p:oleObj name="Equation" r:id="rId9" imgW="1485900" imgH="215900" progId="Equation.3">
+                <p:oleObj name="Equation" r:id="rId8" imgW="1485900" imgH="215900" progId="Equation.3">
                   <p:embed/>
                   <p:pic>
                     <p:nvPicPr>
@@ -37501,7 +37496,7 @@
                       <p:nvPr/>
                     </p:nvPicPr>
                     <p:blipFill>
-                      <a:blip r:embed="rId10"/>
+                      <a:blip r:embed="rId9"/>
                       <a:srcRect/>
                       <a:stretch>
                         <a:fillRect/>
@@ -37518,7 +37513,7 @@
                       <a:noFill/>
                       <a:extLst>
                         <a:ext uri="{909E8E84-426E-40dd-AFC4-6F175D3DCCD1}">
-                          <a14:hiddenFill xmlns:a14="http://schemas.microsoft.com/office/drawing/2010/main" xmlns="">
+                          <a14:hiddenFill xmlns="" xmlns:a14="http://schemas.microsoft.com/office/drawing/2010/main">
                             <a:solidFill>
                               <a:srgbClr val="FFFFFF"/>
                             </a:solidFill>
@@ -38195,12 +38190,12 @@
           <a:graphicData uri="http://schemas.openxmlformats.org/presentationml/2006/ole">
             <mc:AlternateContent xmlns:mc="http://schemas.openxmlformats.org/markup-compatibility/2006">
               <mc:Choice xmlns:v="urn:schemas-microsoft-com:vml" Requires="v">
-                <p:oleObj spid="_x0000_s98325" name="Equation" r:id="rId3" imgW="1930400" imgH="457200" progId="Equation.3">
+                <p:oleObj name="Equation" r:id="rId2" imgW="1930400" imgH="457200" progId="Equation.3">
                   <p:embed/>
                 </p:oleObj>
               </mc:Choice>
               <mc:Fallback>
-                <p:oleObj name="Equation" r:id="rId3" imgW="1930400" imgH="457200" progId="Equation.3">
+                <p:oleObj name="Equation" r:id="rId2" imgW="1930400" imgH="457200" progId="Equation.3">
                   <p:embed/>
                   <p:pic>
                     <p:nvPicPr>
@@ -38209,7 +38204,7 @@
                       <p:nvPr/>
                     </p:nvPicPr>
                     <p:blipFill>
-                      <a:blip r:embed="rId4"/>
+                      <a:blip r:embed="rId3"/>
                       <a:stretch>
                         <a:fillRect/>
                       </a:stretch>

</xml_diff>

<commit_message>
Reviewed lecture on gradient descent
</commit_message>
<xml_diff>
--- a/Lectures/Lecture 09_Gradient Descent.pptx
+++ b/Lectures/Lecture 09_Gradient Descent.pptx
@@ -291,7 +291,7 @@
           <a:p>
             <a:fld id="{A2A66397-F0F1-D843-B110-D1D2A5295B23}" type="datetimeFigureOut">
               <a:rPr lang="en-US" smtClean="0"/>
-              <a:t>10/6/23</a:t>
+              <a:t>11/16/23</a:t>
             </a:fld>
             <a:endParaRPr lang="en-US"/>
           </a:p>
@@ -468,7 +468,7 @@
           <a:p>
             <a:fld id="{3FE918EF-26F2-F641-9B39-65E2E78847ED}" type="datetimeFigureOut">
               <a:rPr lang="en-US" smtClean="0"/>
-              <a:t>10/6/23</a:t>
+              <a:t>11/16/23</a:t>
             </a:fld>
             <a:endParaRPr lang="en-US"/>
           </a:p>
@@ -1904,7 +1904,7 @@
             <a:fld id="{23A271A1-F6D6-438B-A432-4747EE7ECD40}" type="datetimeFigureOut">
               <a:rPr lang="en-US" smtClean="0"/>
               <a:pPr algn="ctr" eaLnBrk="1" latinLnBrk="0" hangingPunct="1"/>
-              <a:t>10/6/23</a:t>
+              <a:t>11/16/23</a:t>
             </a:fld>
             <a:endParaRPr lang="en-US" sz="2000" dirty="0">
               <a:solidFill>
@@ -2110,7 +2110,7 @@
             <a:fld id="{23A271A1-F6D6-438B-A432-4747EE7ECD40}" type="datetimeFigureOut">
               <a:rPr lang="en-US" smtClean="0"/>
               <a:pPr eaLnBrk="1" latinLnBrk="0" hangingPunct="1"/>
-              <a:t>10/6/23</a:t>
+              <a:t>11/16/23</a:t>
             </a:fld>
             <a:endParaRPr lang="en-US"/>
           </a:p>
@@ -2297,7 +2297,7 @@
             <a:fld id="{23A271A1-F6D6-438B-A432-4747EE7ECD40}" type="datetimeFigureOut">
               <a:rPr lang="en-US" smtClean="0"/>
               <a:pPr eaLnBrk="1" latinLnBrk="0" hangingPunct="1"/>
-              <a:t>10/6/23</a:t>
+              <a:t>11/16/23</a:t>
             </a:fld>
             <a:endParaRPr lang="en-US" dirty="0"/>
           </a:p>
@@ -2562,7 +2562,7 @@
             <a:fld id="{23A271A1-F6D6-438B-A432-4747EE7ECD40}" type="datetimeFigureOut">
               <a:rPr lang="en-US" smtClean="0"/>
               <a:pPr eaLnBrk="1" latinLnBrk="0" hangingPunct="1"/>
-              <a:t>10/6/23</a:t>
+              <a:t>11/16/23</a:t>
             </a:fld>
             <a:endParaRPr lang="en-US" dirty="0"/>
           </a:p>
@@ -2984,7 +2984,7 @@
             <a:fld id="{23A271A1-F6D6-438B-A432-4747EE7ECD40}" type="datetimeFigureOut">
               <a:rPr lang="en-US" smtClean="0"/>
               <a:pPr eaLnBrk="1" latinLnBrk="0" hangingPunct="1"/>
-              <a:t>10/6/23</a:t>
+              <a:t>11/16/23</a:t>
             </a:fld>
             <a:endParaRPr lang="en-US"/>
           </a:p>
@@ -3233,7 +3233,7 @@
             <a:fld id="{23A271A1-F6D6-438B-A432-4747EE7ECD40}" type="datetimeFigureOut">
               <a:rPr lang="en-US" smtClean="0"/>
               <a:pPr eaLnBrk="1" latinLnBrk="0" hangingPunct="1"/>
-              <a:t>10/6/23</a:t>
+              <a:t>11/16/23</a:t>
             </a:fld>
             <a:endParaRPr lang="en-US"/>
           </a:p>
@@ -3472,7 +3472,7 @@
             <a:fld id="{23A271A1-F6D6-438B-A432-4747EE7ECD40}" type="datetimeFigureOut">
               <a:rPr lang="en-US" smtClean="0"/>
               <a:pPr eaLnBrk="1" latinLnBrk="0" hangingPunct="1"/>
-              <a:t>10/6/23</a:t>
+              <a:t>11/16/23</a:t>
             </a:fld>
             <a:endParaRPr lang="en-US"/>
           </a:p>
@@ -3670,7 +3670,7 @@
             <a:fld id="{23A271A1-F6D6-438B-A432-4747EE7ECD40}" type="datetimeFigureOut">
               <a:rPr lang="en-US" smtClean="0"/>
               <a:pPr eaLnBrk="1" latinLnBrk="0" hangingPunct="1"/>
-              <a:t>10/6/23</a:t>
+              <a:t>11/16/23</a:t>
             </a:fld>
             <a:endParaRPr lang="en-US"/>
           </a:p>
@@ -3775,7 +3775,7 @@
             <a:fld id="{23A271A1-F6D6-438B-A432-4747EE7ECD40}" type="datetimeFigureOut">
               <a:rPr lang="en-US" smtClean="0"/>
               <a:pPr eaLnBrk="1" latinLnBrk="0" hangingPunct="1"/>
-              <a:t>10/6/23</a:t>
+              <a:t>11/16/23</a:t>
             </a:fld>
             <a:endParaRPr lang="en-US"/>
           </a:p>
@@ -3917,7 +3917,7 @@
             <a:fld id="{23A271A1-F6D6-438B-A432-4747EE7ECD40}" type="datetimeFigureOut">
               <a:rPr lang="en-US" smtClean="0"/>
               <a:pPr eaLnBrk="1" latinLnBrk="0" hangingPunct="1"/>
-              <a:t>10/6/23</a:t>
+              <a:t>11/16/23</a:t>
             </a:fld>
             <a:endParaRPr lang="en-US"/>
           </a:p>
@@ -4441,7 +4441,7 @@
             <a:fld id="{23A271A1-F6D6-438B-A432-4747EE7ECD40}" type="datetimeFigureOut">
               <a:rPr lang="en-US" smtClean="0"/>
               <a:pPr eaLnBrk="1" latinLnBrk="0" hangingPunct="1"/>
-              <a:t>10/6/23</a:t>
+              <a:t>11/16/23</a:t>
             </a:fld>
             <a:endParaRPr lang="en-US"/>
           </a:p>
@@ -4704,7 +4704,7 @@
             <a:fld id="{23A271A1-F6D6-438B-A432-4747EE7ECD40}" type="datetimeFigureOut">
               <a:rPr lang="en-US" smtClean="0"/>
               <a:pPr eaLnBrk="1" latinLnBrk="0" hangingPunct="1"/>
-              <a:t>10/6/23</a:t>
+              <a:t>11/16/23</a:t>
             </a:fld>
             <a:endParaRPr lang="en-US" sz="1400" dirty="0">
               <a:solidFill>
@@ -33915,8 +33915,8 @@
           </p:sp>
         </mc:Fallback>
       </mc:AlternateContent>
-      <mc:AlternateContent xmlns:mc="http://schemas.openxmlformats.org/markup-compatibility/2006" xmlns:a14="http://schemas.microsoft.com/office/drawing/2010/main">
-        <mc:Choice Requires="a14">
+      <mc:AlternateContent xmlns:mc="http://schemas.openxmlformats.org/markup-compatibility/2006">
+        <mc:Choice xmlns:a14="http://schemas.microsoft.com/office/drawing/2010/main" Requires="a14">
           <p:sp>
             <p:nvSpPr>
               <p:cNvPr id="7" name="TextBox 6">
@@ -33932,7 +33932,7 @@
             <p:spPr>
               <a:xfrm>
                 <a:off x="2941106" y="4165335"/>
-                <a:ext cx="5660332" cy="559127"/>
+                <a:ext cx="5743688" cy="559127"/>
               </a:xfrm>
               <a:prstGeom prst="rect">
                 <a:avLst/>
@@ -33984,6 +33984,10 @@
                     </m:f>
                   </m:oMath>
                 </a14:m>
+                <a:r>
+                  <a:rPr lang="en-US" sz="2400" dirty="0"/>
+                  <a:t>(</a:t>
+                </a:r>
                 <a:r>
                   <a:rPr lang="en-US" sz="2400" dirty="0" err="1"/>
                   <a:t>y</a:t>
@@ -34149,7 +34153,7 @@
             </p:txBody>
           </p:sp>
         </mc:Choice>
-        <mc:Fallback xmlns="">
+        <mc:Fallback>
           <p:sp>
             <p:nvSpPr>
               <p:cNvPr id="7" name="TextBox 6">
@@ -34167,7 +34171,7 @@
             <p:spPr>
               <a:xfrm>
                 <a:off x="2941106" y="4165335"/>
-                <a:ext cx="5660332" cy="559127"/>
+                <a:ext cx="5743688" cy="559127"/>
               </a:xfrm>
               <a:prstGeom prst="rect">
                 <a:avLst/>
@@ -34175,7 +34179,7 @@
               <a:blipFill>
                 <a:blip r:embed="rId5"/>
                 <a:stretch>
-                  <a:fillRect l="-3363" t="-2222" r="-2242" b="-20000"/>
+                  <a:fillRect l="-3311" t="-2222" r="-2428" b="-22222"/>
                 </a:stretch>
               </a:blipFill>
             </p:spPr>
@@ -34950,7 +34954,7 @@
                       <a:noFill/>
                       <a:extLst>
                         <a:ext uri="{909E8E84-426E-40dd-AFC4-6F175D3DCCD1}">
-                          <a14:hiddenFill xmlns="" xmlns:a14="http://schemas.microsoft.com/office/drawing/2010/main">
+                          <a14:hiddenFill xmlns:a14="http://schemas.microsoft.com/office/drawing/2010/main" xmlns="">
                             <a:solidFill>
                               <a:srgbClr val="FFFFFF"/>
                             </a:solidFill>
@@ -35105,7 +35109,7 @@
                       <a:noFill/>
                       <a:extLst>
                         <a:ext uri="{909E8E84-426E-40dd-AFC4-6F175D3DCCD1}">
-                          <a14:hiddenFill xmlns="" xmlns:a14="http://schemas.microsoft.com/office/drawing/2010/main">
+                          <a14:hiddenFill xmlns:a14="http://schemas.microsoft.com/office/drawing/2010/main" xmlns="">
                             <a:solidFill>
                               <a:srgbClr val="FFFFFF"/>
                             </a:solidFill>
@@ -35175,7 +35179,7 @@
                       <a:noFill/>
                       <a:extLst>
                         <a:ext uri="{909E8E84-426E-40dd-AFC4-6F175D3DCCD1}">
-                          <a14:hiddenFill xmlns="" xmlns:a14="http://schemas.microsoft.com/office/drawing/2010/main">
+                          <a14:hiddenFill xmlns:a14="http://schemas.microsoft.com/office/drawing/2010/main" xmlns="">
                             <a:solidFill>
                               <a:srgbClr val="FFFFFF"/>
                             </a:solidFill>
@@ -35727,7 +35731,7 @@
                       <a:noFill/>
                       <a:extLst>
                         <a:ext uri="{909E8E84-426E-40dd-AFC4-6F175D3DCCD1}">
-                          <a14:hiddenFill xmlns="" xmlns:a14="http://schemas.microsoft.com/office/drawing/2010/main">
+                          <a14:hiddenFill xmlns:a14="http://schemas.microsoft.com/office/drawing/2010/main" xmlns="">
                             <a:solidFill>
                               <a:srgbClr val="FFFFFF"/>
                             </a:solidFill>
@@ -35828,7 +35832,7 @@
                       <a:noFill/>
                       <a:extLst>
                         <a:ext uri="{909E8E84-426E-40dd-AFC4-6F175D3DCCD1}">
-                          <a14:hiddenFill xmlns="" xmlns:a14="http://schemas.microsoft.com/office/drawing/2010/main">
+                          <a14:hiddenFill xmlns:a14="http://schemas.microsoft.com/office/drawing/2010/main" xmlns="">
                             <a:solidFill>
                               <a:srgbClr val="FFFFFF"/>
                             </a:solidFill>
@@ -35956,7 +35960,7 @@
                       <a:noFill/>
                       <a:extLst>
                         <a:ext uri="{909E8E84-426E-40dd-AFC4-6F175D3DCCD1}">
-                          <a14:hiddenFill xmlns="" xmlns:a14="http://schemas.microsoft.com/office/drawing/2010/main">
+                          <a14:hiddenFill xmlns:a14="http://schemas.microsoft.com/office/drawing/2010/main" xmlns="">
                             <a:solidFill>
                               <a:srgbClr val="FFFFFF"/>
                             </a:solidFill>
@@ -36078,7 +36082,7 @@
                       <a:noFill/>
                       <a:extLst>
                         <a:ext uri="{909E8E84-426E-40dd-AFC4-6F175D3DCCD1}">
-                          <a14:hiddenFill xmlns="" xmlns:a14="http://schemas.microsoft.com/office/drawing/2010/main">
+                          <a14:hiddenFill xmlns:a14="http://schemas.microsoft.com/office/drawing/2010/main" xmlns="">
                             <a:solidFill>
                               <a:srgbClr val="FFFFFF"/>
                             </a:solidFill>
@@ -36582,7 +36586,7 @@
                       <a:noFill/>
                       <a:extLst>
                         <a:ext uri="{909E8E84-426E-40dd-AFC4-6F175D3DCCD1}">
-                          <a14:hiddenFill xmlns="" xmlns:a14="http://schemas.microsoft.com/office/drawing/2010/main">
+                          <a14:hiddenFill xmlns:a14="http://schemas.microsoft.com/office/drawing/2010/main" xmlns="">
                             <a:solidFill>
                               <a:srgbClr val="FFFFFF"/>
                             </a:solidFill>
@@ -37284,7 +37288,7 @@
                       <a:noFill/>
                       <a:extLst>
                         <a:ext uri="{909E8E84-426E-40dd-AFC4-6F175D3DCCD1}">
-                          <a14:hiddenFill xmlns="" xmlns:a14="http://schemas.microsoft.com/office/drawing/2010/main">
+                          <a14:hiddenFill xmlns:a14="http://schemas.microsoft.com/office/drawing/2010/main" xmlns="">
                             <a:solidFill>
                               <a:srgbClr val="FFFFFF"/>
                             </a:solidFill>
@@ -37385,7 +37389,7 @@
                       <a:noFill/>
                       <a:extLst>
                         <a:ext uri="{909E8E84-426E-40dd-AFC4-6F175D3DCCD1}">
-                          <a14:hiddenFill xmlns="" xmlns:a14="http://schemas.microsoft.com/office/drawing/2010/main">
+                          <a14:hiddenFill xmlns:a14="http://schemas.microsoft.com/office/drawing/2010/main" xmlns="">
                             <a:solidFill>
                               <a:srgbClr val="FFFFFF"/>
                             </a:solidFill>
@@ -37513,7 +37517,7 @@
                       <a:noFill/>
                       <a:extLst>
                         <a:ext uri="{909E8E84-426E-40dd-AFC4-6F175D3DCCD1}">
-                          <a14:hiddenFill xmlns="" xmlns:a14="http://schemas.microsoft.com/office/drawing/2010/main">
+                          <a14:hiddenFill xmlns:a14="http://schemas.microsoft.com/office/drawing/2010/main" xmlns="">
                             <a:solidFill>
                               <a:srgbClr val="FFFFFF"/>
                             </a:solidFill>
@@ -38278,23 +38282,7 @@
                   <a:srgbClr val="0000FF"/>
                 </a:solidFill>
               </a:rPr>
-              <a:t>We still need to be careful about </a:t>
-            </a:r>
-            <a:r>
-              <a:rPr lang="en-US" sz="2400" dirty="0" err="1">
-                <a:solidFill>
-                  <a:srgbClr val="0000FF"/>
-                </a:solidFill>
-              </a:rPr>
-              <a:t>overfitting</a:t>
-            </a:r>
-            <a:r>
-              <a:rPr lang="en-US" sz="2400" dirty="0">
-                <a:solidFill>
-                  <a:srgbClr val="0000FF"/>
-                </a:solidFill>
-              </a:rPr>
-              <a:t>!</a:t>
+              <a:t>We still need to be careful about overfitting!</a:t>
             </a:r>
           </a:p>
           <a:p>

</xml_diff>